<commit_message>
Facade (Aprensentação Padrões de Projeto)
</commit_message>
<xml_diff>
--- a/Docs/Apresentação Padrões de Projetos.pptx
+++ b/Docs/Apresentação Padrões de Projetos.pptx
@@ -18,6 +18,11 @@
     <p:sldId id="259" r:id="rId12"/>
     <p:sldId id="270" r:id="rId13"/>
     <p:sldId id="260" r:id="rId14"/>
+    <p:sldId id="271" r:id="rId15"/>
+    <p:sldId id="272" r:id="rId16"/>
+    <p:sldId id="273" r:id="rId17"/>
+    <p:sldId id="274" r:id="rId18"/>
+    <p:sldId id="275" r:id="rId19"/>
   </p:sldIdLst>
   <p:sldSz cx="9144000" cy="6858000" type="screen4x3"/>
   <p:notesSz cx="6858000" cy="9144000"/>
@@ -116,7 +121,27 @@
       </a:defRPr>
     </a:lvl9pPr>
   </p:defaultTextStyle>
+  <p:extLst>
+    <p:ext uri="{EFAFB233-063F-42B5-8137-9DF3F51BA10A}">
+      <p15:sldGuideLst xmlns:p15="http://schemas.microsoft.com/office/powerpoint/2012/main">
+        <p15:guide id="1" orient="horz" pos="2160">
+          <p15:clr>
+            <a:srgbClr val="A4A3A4"/>
+          </p15:clr>
+        </p15:guide>
+        <p15:guide id="2" pos="2880">
+          <p15:clr>
+            <a:srgbClr val="A4A3A4"/>
+          </p15:clr>
+        </p15:guide>
+      </p15:sldGuideLst>
+    </p:ext>
+  </p:extLst>
 </p:presentation>
+</file>
+
+<file path=ppt/revisionInfo.xml><?xml version="1.0" encoding="utf-8"?>
+<p1510:revInfo xmlns:a="http://schemas.openxmlformats.org/drawingml/2006/main" xmlns:r="http://schemas.openxmlformats.org/officeDocument/2006/relationships" xmlns:p1510="http://schemas.microsoft.com/office/powerpoint/2015/10/main"/>
 </file>
 
 <file path=ppt/slideLayouts/slideLayout1.xml><?xml version="1.0" encoding="utf-8"?>
@@ -166,7 +191,7 @@
           </a:lstStyle>
           <a:p>
             <a:r>
-              <a:rPr lang="en-US" smtClean="0"/>
+              <a:rPr lang="en-US"/>
               <a:t>Click to edit Master title style</a:t>
             </a:r>
             <a:endParaRPr lang="en-US" dirty="0"/>
@@ -287,7 +312,7 @@
           </a:lstStyle>
           <a:p>
             <a:r>
-              <a:rPr lang="en-US" smtClean="0"/>
+              <a:rPr lang="en-US"/>
               <a:t>Click to edit Master subtitle style</a:t>
             </a:r>
             <a:endParaRPr lang="en-US" dirty="0"/>
@@ -311,7 +336,7 @@
           <a:p>
             <a:fld id="{8EE831F1-ED05-4BAA-8C74-2BAAB7F343BB}" type="datetimeFigureOut">
               <a:rPr lang="pt-BR" smtClean="0"/>
-              <a:t>11/06/2017</a:t>
+              <a:t>12/06/2017</a:t>
             </a:fld>
             <a:endParaRPr lang="pt-BR"/>
           </a:p>
@@ -334,7 +359,7 @@
           <a:p>
             <a:fld id="{EF5993D9-3239-4E1A-B177-3A3DADB6A390}" type="slidenum">
               <a:rPr lang="pt-BR" smtClean="0"/>
-              <a:t>‹#›</a:t>
+              <a:t>‹nº›</a:t>
             </a:fld>
             <a:endParaRPr lang="pt-BR"/>
           </a:p>
@@ -400,7 +425,7 @@
           <a:lstStyle/>
           <a:p>
             <a:r>
-              <a:rPr lang="en-US" smtClean="0"/>
+              <a:rPr lang="en-US"/>
               <a:t>Click to edit Master title style</a:t>
             </a:r>
             <a:endParaRPr lang="en-US" dirty="0"/>
@@ -424,38 +449,37 @@
           <a:p>
             <a:pPr lvl="0"/>
             <a:r>
-              <a:rPr lang="en-US" smtClean="0"/>
+              <a:rPr lang="en-US"/>
               <a:t>Click to edit Master text styles</a:t>
             </a:r>
           </a:p>
           <a:p>
             <a:pPr lvl="1"/>
             <a:r>
-              <a:rPr lang="en-US" smtClean="0"/>
+              <a:rPr lang="en-US"/>
               <a:t>Second level</a:t>
             </a:r>
           </a:p>
           <a:p>
             <a:pPr lvl="2"/>
             <a:r>
-              <a:rPr lang="en-US" smtClean="0"/>
+              <a:rPr lang="en-US"/>
               <a:t>Third level</a:t>
             </a:r>
           </a:p>
           <a:p>
             <a:pPr lvl="3"/>
             <a:r>
-              <a:rPr lang="en-US" smtClean="0"/>
+              <a:rPr lang="en-US"/>
               <a:t>Fourth level</a:t>
             </a:r>
           </a:p>
           <a:p>
             <a:pPr lvl="4"/>
             <a:r>
-              <a:rPr lang="en-US" smtClean="0"/>
+              <a:rPr lang="en-US"/>
               <a:t>Fifth level</a:t>
             </a:r>
-            <a:endParaRPr lang="en-US"/>
           </a:p>
         </p:txBody>
       </p:sp>
@@ -476,7 +500,7 @@
           <a:p>
             <a:fld id="{8EE831F1-ED05-4BAA-8C74-2BAAB7F343BB}" type="datetimeFigureOut">
               <a:rPr lang="pt-BR" smtClean="0"/>
-              <a:t>11/06/2017</a:t>
+              <a:t>12/06/2017</a:t>
             </a:fld>
             <a:endParaRPr lang="pt-BR"/>
           </a:p>
@@ -518,7 +542,7 @@
           <a:p>
             <a:fld id="{EF5993D9-3239-4E1A-B177-3A3DADB6A390}" type="slidenum">
               <a:rPr lang="pt-BR" smtClean="0"/>
-              <a:t>‹#›</a:t>
+              <a:t>‹nº›</a:t>
             </a:fld>
             <a:endParaRPr lang="pt-BR"/>
           </a:p>
@@ -570,7 +594,7 @@
           <a:lstStyle/>
           <a:p>
             <a:r>
-              <a:rPr lang="en-US" smtClean="0"/>
+              <a:rPr lang="en-US"/>
               <a:t>Click to edit Master title style</a:t>
             </a:r>
             <a:endParaRPr lang="en-US" dirty="0"/>
@@ -599,38 +623,37 @@
           <a:p>
             <a:pPr lvl="0"/>
             <a:r>
-              <a:rPr lang="en-US" smtClean="0"/>
+              <a:rPr lang="en-US"/>
               <a:t>Click to edit Master text styles</a:t>
             </a:r>
           </a:p>
           <a:p>
             <a:pPr lvl="1"/>
             <a:r>
-              <a:rPr lang="en-US" smtClean="0"/>
+              <a:rPr lang="en-US"/>
               <a:t>Second level</a:t>
             </a:r>
           </a:p>
           <a:p>
             <a:pPr lvl="2"/>
             <a:r>
-              <a:rPr lang="en-US" smtClean="0"/>
+              <a:rPr lang="en-US"/>
               <a:t>Third level</a:t>
             </a:r>
           </a:p>
           <a:p>
             <a:pPr lvl="3"/>
             <a:r>
-              <a:rPr lang="en-US" smtClean="0"/>
+              <a:rPr lang="en-US"/>
               <a:t>Fourth level</a:t>
             </a:r>
           </a:p>
           <a:p>
             <a:pPr lvl="4"/>
             <a:r>
-              <a:rPr lang="en-US" smtClean="0"/>
+              <a:rPr lang="en-US"/>
               <a:t>Fifth level</a:t>
             </a:r>
-            <a:endParaRPr lang="en-US"/>
           </a:p>
         </p:txBody>
       </p:sp>
@@ -651,7 +674,7 @@
           <a:p>
             <a:fld id="{8EE831F1-ED05-4BAA-8C74-2BAAB7F343BB}" type="datetimeFigureOut">
               <a:rPr lang="pt-BR" smtClean="0"/>
-              <a:t>11/06/2017</a:t>
+              <a:t>12/06/2017</a:t>
             </a:fld>
             <a:endParaRPr lang="pt-BR"/>
           </a:p>
@@ -693,7 +716,7 @@
           <a:p>
             <a:fld id="{EF5993D9-3239-4E1A-B177-3A3DADB6A390}" type="slidenum">
               <a:rPr lang="pt-BR" smtClean="0"/>
-              <a:t>‹#›</a:t>
+              <a:t>‹nº›</a:t>
             </a:fld>
             <a:endParaRPr lang="pt-BR"/>
           </a:p>
@@ -740,7 +763,7 @@
           <a:lstStyle/>
           <a:p>
             <a:r>
-              <a:rPr lang="en-US" smtClean="0"/>
+              <a:rPr lang="en-US"/>
               <a:t>Click to edit Master title style</a:t>
             </a:r>
             <a:endParaRPr lang="en-US" dirty="0"/>
@@ -782,38 +805,38 @@
           <a:p>
             <a:pPr lvl="0"/>
             <a:r>
-              <a:rPr lang="en-US" smtClean="0"/>
+              <a:rPr lang="en-US"/>
               <a:t>Click to edit Master text styles</a:t>
             </a:r>
           </a:p>
           <a:p>
             <a:pPr lvl="1"/>
             <a:r>
-              <a:rPr lang="en-US" smtClean="0"/>
+              <a:rPr lang="en-US"/>
               <a:t>Second level</a:t>
             </a:r>
           </a:p>
           <a:p>
             <a:pPr lvl="2"/>
             <a:r>
-              <a:rPr lang="en-US" smtClean="0"/>
+              <a:rPr lang="en-US"/>
               <a:t>Third level</a:t>
             </a:r>
           </a:p>
           <a:p>
             <a:pPr lvl="3"/>
             <a:r>
-              <a:rPr lang="en-US" smtClean="0"/>
+              <a:rPr lang="en-US"/>
               <a:t>Fourth level</a:t>
             </a:r>
           </a:p>
           <a:p>
             <a:pPr lvl="4"/>
             <a:r>
-              <a:rPr lang="en-US" smtClean="0"/>
+              <a:rPr lang="en-US"/>
               <a:t>Fifth level</a:t>
             </a:r>
-            <a:endParaRPr lang="en-US" dirty="0" smtClean="0"/>
+            <a:endParaRPr lang="en-US" dirty="0"/>
           </a:p>
         </p:txBody>
       </p:sp>
@@ -834,7 +857,7 @@
           <a:p>
             <a:fld id="{8EE831F1-ED05-4BAA-8C74-2BAAB7F343BB}" type="datetimeFigureOut">
               <a:rPr lang="pt-BR" smtClean="0"/>
-              <a:t>11/06/2017</a:t>
+              <a:t>12/06/2017</a:t>
             </a:fld>
             <a:endParaRPr lang="pt-BR"/>
           </a:p>
@@ -876,7 +899,7 @@
           <a:p>
             <a:fld id="{EF5993D9-3239-4E1A-B177-3A3DADB6A390}" type="slidenum">
               <a:rPr lang="pt-BR" smtClean="0"/>
-              <a:t>‹#›</a:t>
+              <a:t>‹nº›</a:t>
             </a:fld>
             <a:endParaRPr lang="pt-BR"/>
           </a:p>
@@ -953,7 +976,7 @@
           </a:lstStyle>
           <a:p>
             <a:r>
-              <a:rPr lang="en-US" smtClean="0"/>
+              <a:rPr lang="en-US"/>
               <a:t>Click to edit Master title style</a:t>
             </a:r>
             <a:endParaRPr lang="en-US" dirty="0"/>
@@ -1073,7 +1096,7 @@
           <a:p>
             <a:pPr lvl="0"/>
             <a:r>
-              <a:rPr lang="en-US" smtClean="0"/>
+              <a:rPr lang="en-US"/>
               <a:t>Click to edit Master text styles</a:t>
             </a:r>
           </a:p>
@@ -1096,7 +1119,7 @@
           <a:p>
             <a:fld id="{8EE831F1-ED05-4BAA-8C74-2BAAB7F343BB}" type="datetimeFigureOut">
               <a:rPr lang="pt-BR" smtClean="0"/>
-              <a:t>11/06/2017</a:t>
+              <a:t>12/06/2017</a:t>
             </a:fld>
             <a:endParaRPr lang="pt-BR"/>
           </a:p>
@@ -1138,7 +1161,7 @@
           <a:p>
             <a:fld id="{EF5993D9-3239-4E1A-B177-3A3DADB6A390}" type="slidenum">
               <a:rPr lang="pt-BR" smtClean="0"/>
-              <a:t>‹#›</a:t>
+              <a:t>‹nº›</a:t>
             </a:fld>
             <a:endParaRPr lang="pt-BR"/>
           </a:p>
@@ -1335,10 +1358,9 @@
           <a:lstStyle/>
           <a:p>
             <a:r>
-              <a:rPr lang="en-US" smtClean="0"/>
+              <a:rPr lang="en-US"/>
               <a:t>Click to edit Master title style</a:t>
             </a:r>
-            <a:endParaRPr lang="en-US"/>
           </a:p>
         </p:txBody>
       </p:sp>
@@ -1392,38 +1414,38 @@
           <a:p>
             <a:pPr lvl="0"/>
             <a:r>
-              <a:rPr lang="en-US" smtClean="0"/>
+              <a:rPr lang="en-US"/>
               <a:t>Click to edit Master text styles</a:t>
             </a:r>
           </a:p>
           <a:p>
             <a:pPr lvl="1"/>
             <a:r>
-              <a:rPr lang="en-US" smtClean="0"/>
+              <a:rPr lang="en-US"/>
               <a:t>Second level</a:t>
             </a:r>
           </a:p>
           <a:p>
             <a:pPr lvl="2"/>
             <a:r>
-              <a:rPr lang="en-US" smtClean="0"/>
+              <a:rPr lang="en-US"/>
               <a:t>Third level</a:t>
             </a:r>
           </a:p>
           <a:p>
             <a:pPr lvl="3"/>
             <a:r>
-              <a:rPr lang="en-US" smtClean="0"/>
+              <a:rPr lang="en-US"/>
               <a:t>Fourth level</a:t>
             </a:r>
           </a:p>
           <a:p>
             <a:pPr lvl="4"/>
             <a:r>
-              <a:rPr lang="en-US" smtClean="0"/>
+              <a:rPr lang="en-US"/>
               <a:t>Fifth level</a:t>
             </a:r>
-            <a:endParaRPr lang="en-US" dirty="0" smtClean="0"/>
+            <a:endParaRPr lang="en-US" dirty="0"/>
           </a:p>
         </p:txBody>
       </p:sp>
@@ -1444,7 +1466,7 @@
           <a:p>
             <a:fld id="{8EE831F1-ED05-4BAA-8C74-2BAAB7F343BB}" type="datetimeFigureOut">
               <a:rPr lang="pt-BR" smtClean="0"/>
-              <a:t>11/06/2017</a:t>
+              <a:t>12/06/2017</a:t>
             </a:fld>
             <a:endParaRPr lang="pt-BR"/>
           </a:p>
@@ -1486,7 +1508,7 @@
           <a:p>
             <a:fld id="{EF5993D9-3239-4E1A-B177-3A3DADB6A390}" type="slidenum">
               <a:rPr lang="pt-BR" smtClean="0"/>
-              <a:t>‹#›</a:t>
+              <a:t>‹nº›</a:t>
             </a:fld>
             <a:endParaRPr lang="pt-BR"/>
           </a:p>
@@ -1514,38 +1536,37 @@
           <a:p>
             <a:pPr lvl="0"/>
             <a:r>
-              <a:rPr lang="en-US" smtClean="0"/>
+              <a:rPr lang="en-US"/>
               <a:t>Click to edit Master text styles</a:t>
             </a:r>
           </a:p>
           <a:p>
             <a:pPr lvl="1"/>
             <a:r>
-              <a:rPr lang="en-US" smtClean="0"/>
+              <a:rPr lang="en-US"/>
               <a:t>Second level</a:t>
             </a:r>
           </a:p>
           <a:p>
             <a:pPr lvl="2"/>
             <a:r>
-              <a:rPr lang="en-US" smtClean="0"/>
+              <a:rPr lang="en-US"/>
               <a:t>Third level</a:t>
             </a:r>
           </a:p>
           <a:p>
             <a:pPr lvl="3"/>
             <a:r>
-              <a:rPr lang="en-US" smtClean="0"/>
+              <a:rPr lang="en-US"/>
               <a:t>Fourth level</a:t>
             </a:r>
           </a:p>
           <a:p>
             <a:pPr lvl="4"/>
             <a:r>
-              <a:rPr lang="en-US" smtClean="0"/>
+              <a:rPr lang="en-US"/>
               <a:t>Fifth level</a:t>
             </a:r>
-            <a:endParaRPr lang="en-US"/>
           </a:p>
         </p:txBody>
       </p:sp>
@@ -1594,10 +1615,9 @@
           </a:lstStyle>
           <a:p>
             <a:r>
-              <a:rPr lang="en-US" smtClean="0"/>
+              <a:rPr lang="en-US"/>
               <a:t>Click to edit Master title style</a:t>
             </a:r>
-            <a:endParaRPr lang="en-US"/>
           </a:p>
         </p:txBody>
       </p:sp>
@@ -1662,7 +1682,7 @@
           <a:p>
             <a:pPr lvl="0"/>
             <a:r>
-              <a:rPr lang="en-US" smtClean="0"/>
+              <a:rPr lang="en-US"/>
               <a:t>Click to edit Master text styles</a:t>
             </a:r>
           </a:p>
@@ -1729,7 +1749,7 @@
           <a:p>
             <a:pPr lvl="0"/>
             <a:r>
-              <a:rPr lang="en-US" smtClean="0"/>
+              <a:rPr lang="en-US"/>
               <a:t>Click to edit Master text styles</a:t>
             </a:r>
           </a:p>
@@ -1752,7 +1772,7 @@
           <a:p>
             <a:fld id="{8EE831F1-ED05-4BAA-8C74-2BAAB7F343BB}" type="datetimeFigureOut">
               <a:rPr lang="pt-BR" smtClean="0"/>
-              <a:t>11/06/2017</a:t>
+              <a:t>12/06/2017</a:t>
             </a:fld>
             <a:endParaRPr lang="pt-BR"/>
           </a:p>
@@ -1794,7 +1814,7 @@
           <a:p>
             <a:fld id="{EF5993D9-3239-4E1A-B177-3A3DADB6A390}" type="slidenum">
               <a:rPr lang="pt-BR" smtClean="0"/>
-              <a:t>‹#›</a:t>
+              <a:t>‹nº›</a:t>
             </a:fld>
             <a:endParaRPr lang="pt-BR"/>
           </a:p>
@@ -1822,35 +1842,35 @@
           <a:p>
             <a:pPr lvl="0"/>
             <a:r>
-              <a:rPr lang="en-US" smtClean="0"/>
+              <a:rPr lang="en-US"/>
               <a:t>Click to edit Master text styles</a:t>
             </a:r>
           </a:p>
           <a:p>
             <a:pPr lvl="1"/>
             <a:r>
-              <a:rPr lang="en-US" smtClean="0"/>
+              <a:rPr lang="en-US"/>
               <a:t>Second level</a:t>
             </a:r>
           </a:p>
           <a:p>
             <a:pPr lvl="2"/>
             <a:r>
-              <a:rPr lang="en-US" smtClean="0"/>
+              <a:rPr lang="en-US"/>
               <a:t>Third level</a:t>
             </a:r>
           </a:p>
           <a:p>
             <a:pPr lvl="3"/>
             <a:r>
-              <a:rPr lang="en-US" smtClean="0"/>
+              <a:rPr lang="en-US"/>
               <a:t>Fourth level</a:t>
             </a:r>
           </a:p>
           <a:p>
             <a:pPr lvl="4"/>
             <a:r>
-              <a:rPr lang="en-US" smtClean="0"/>
+              <a:rPr lang="en-US"/>
               <a:t>Fifth level</a:t>
             </a:r>
             <a:endParaRPr lang="en-US" dirty="0"/>
@@ -1879,35 +1899,35 @@
           <a:p>
             <a:pPr lvl="0"/>
             <a:r>
-              <a:rPr lang="en-US" smtClean="0"/>
+              <a:rPr lang="en-US"/>
               <a:t>Click to edit Master text styles</a:t>
             </a:r>
           </a:p>
           <a:p>
             <a:pPr lvl="1"/>
             <a:r>
-              <a:rPr lang="en-US" smtClean="0"/>
+              <a:rPr lang="en-US"/>
               <a:t>Second level</a:t>
             </a:r>
           </a:p>
           <a:p>
             <a:pPr lvl="2"/>
             <a:r>
-              <a:rPr lang="en-US" smtClean="0"/>
+              <a:rPr lang="en-US"/>
               <a:t>Third level</a:t>
             </a:r>
           </a:p>
           <a:p>
             <a:pPr lvl="3"/>
             <a:r>
-              <a:rPr lang="en-US" smtClean="0"/>
+              <a:rPr lang="en-US"/>
               <a:t>Fourth level</a:t>
             </a:r>
           </a:p>
           <a:p>
             <a:pPr lvl="4"/>
             <a:r>
-              <a:rPr lang="en-US" smtClean="0"/>
+              <a:rPr lang="en-US"/>
               <a:t>Fifth level</a:t>
             </a:r>
             <a:endParaRPr lang="en-US" dirty="0"/>
@@ -1955,7 +1975,7 @@
           <a:lstStyle/>
           <a:p>
             <a:r>
-              <a:rPr lang="en-US" smtClean="0"/>
+              <a:rPr lang="en-US"/>
               <a:t>Click to edit Master title style</a:t>
             </a:r>
             <a:endParaRPr lang="en-US" dirty="0"/>
@@ -1979,7 +1999,7 @@
           <a:p>
             <a:fld id="{8EE831F1-ED05-4BAA-8C74-2BAAB7F343BB}" type="datetimeFigureOut">
               <a:rPr lang="pt-BR" smtClean="0"/>
-              <a:t>11/06/2017</a:t>
+              <a:t>12/06/2017</a:t>
             </a:fld>
             <a:endParaRPr lang="pt-BR"/>
           </a:p>
@@ -2021,7 +2041,7 @@
           <a:p>
             <a:fld id="{EF5993D9-3239-4E1A-B177-3A3DADB6A390}" type="slidenum">
               <a:rPr lang="pt-BR" smtClean="0"/>
-              <a:t>‹#›</a:t>
+              <a:t>‹nº›</a:t>
             </a:fld>
             <a:endParaRPr lang="pt-BR"/>
           </a:p>
@@ -2069,7 +2089,7 @@
           <a:p>
             <a:fld id="{8EE831F1-ED05-4BAA-8C74-2BAAB7F343BB}" type="datetimeFigureOut">
               <a:rPr lang="pt-BR" smtClean="0"/>
-              <a:t>11/06/2017</a:t>
+              <a:t>12/06/2017</a:t>
             </a:fld>
             <a:endParaRPr lang="pt-BR"/>
           </a:p>
@@ -2111,7 +2131,7 @@
           <a:p>
             <a:fld id="{EF5993D9-3239-4E1A-B177-3A3DADB6A390}" type="slidenum">
               <a:rPr lang="pt-BR" smtClean="0"/>
-              <a:t>‹#›</a:t>
+              <a:t>‹nº›</a:t>
             </a:fld>
             <a:endParaRPr lang="pt-BR"/>
           </a:p>
@@ -2178,7 +2198,7 @@
           </a:lstStyle>
           <a:p>
             <a:r>
-              <a:rPr lang="en-US" smtClean="0"/>
+              <a:rPr lang="en-US"/>
               <a:t>Click to edit Master title style</a:t>
             </a:r>
             <a:endParaRPr lang="en-US" dirty="0"/>
@@ -2235,35 +2255,35 @@
           <a:p>
             <a:pPr lvl="0"/>
             <a:r>
-              <a:rPr lang="en-US" smtClean="0"/>
+              <a:rPr lang="en-US"/>
               <a:t>Click to edit Master text styles</a:t>
             </a:r>
           </a:p>
           <a:p>
             <a:pPr lvl="1"/>
             <a:r>
-              <a:rPr lang="en-US" smtClean="0"/>
+              <a:rPr lang="en-US"/>
               <a:t>Second level</a:t>
             </a:r>
           </a:p>
           <a:p>
             <a:pPr lvl="2"/>
             <a:r>
-              <a:rPr lang="en-US" smtClean="0"/>
+              <a:rPr lang="en-US"/>
               <a:t>Third level</a:t>
             </a:r>
           </a:p>
           <a:p>
             <a:pPr lvl="3"/>
             <a:r>
-              <a:rPr lang="en-US" smtClean="0"/>
+              <a:rPr lang="en-US"/>
               <a:t>Fourth level</a:t>
             </a:r>
           </a:p>
           <a:p>
             <a:pPr lvl="4"/>
             <a:r>
-              <a:rPr lang="en-US" smtClean="0"/>
+              <a:rPr lang="en-US"/>
               <a:t>Fifth level</a:t>
             </a:r>
             <a:endParaRPr lang="en-US" dirty="0"/>
@@ -2334,7 +2354,7 @@
           <a:p>
             <a:pPr lvl="0"/>
             <a:r>
-              <a:rPr lang="en-US" smtClean="0"/>
+              <a:rPr lang="en-US"/>
               <a:t>Click to edit Master text styles</a:t>
             </a:r>
           </a:p>
@@ -2357,7 +2377,7 @@
           <a:p>
             <a:fld id="{8EE831F1-ED05-4BAA-8C74-2BAAB7F343BB}" type="datetimeFigureOut">
               <a:rPr lang="pt-BR" smtClean="0"/>
-              <a:t>11/06/2017</a:t>
+              <a:t>12/06/2017</a:t>
             </a:fld>
             <a:endParaRPr lang="pt-BR"/>
           </a:p>
@@ -2399,7 +2419,7 @@
           <a:p>
             <a:fld id="{EF5993D9-3239-4E1A-B177-3A3DADB6A390}" type="slidenum">
               <a:rPr lang="pt-BR" smtClean="0"/>
-              <a:t>‹#›</a:t>
+              <a:t>‹nº›</a:t>
             </a:fld>
             <a:endParaRPr lang="pt-BR"/>
           </a:p>
@@ -2458,7 +2478,7 @@
           </a:lstStyle>
           <a:p>
             <a:r>
-              <a:rPr lang="en-US" smtClean="0"/>
+              <a:rPr lang="en-US"/>
               <a:t>Click to edit Master title style</a:t>
             </a:r>
             <a:endParaRPr lang="en-US" dirty="0"/>
@@ -2535,7 +2555,7 @@
           </a:lstStyle>
           <a:p>
             <a:r>
-              <a:rPr lang="en-US" smtClean="0"/>
+              <a:rPr lang="en-US"/>
               <a:t>Click icon to add picture</a:t>
             </a:r>
             <a:endParaRPr lang="en-US" dirty="0"/>
@@ -2603,7 +2623,7 @@
           <a:p>
             <a:pPr lvl="0"/>
             <a:r>
-              <a:rPr lang="en-US" smtClean="0"/>
+              <a:rPr lang="en-US"/>
               <a:t>Click to edit Master text styles</a:t>
             </a:r>
           </a:p>
@@ -2626,7 +2646,7 @@
           <a:p>
             <a:fld id="{8EE831F1-ED05-4BAA-8C74-2BAAB7F343BB}" type="datetimeFigureOut">
               <a:rPr lang="pt-BR" smtClean="0"/>
-              <a:t>11/06/2017</a:t>
+              <a:t>12/06/2017</a:t>
             </a:fld>
             <a:endParaRPr lang="pt-BR"/>
           </a:p>
@@ -2668,7 +2688,7 @@
           <a:p>
             <a:fld id="{EF5993D9-3239-4E1A-B177-3A3DADB6A390}" type="slidenum">
               <a:rPr lang="pt-BR" smtClean="0"/>
-              <a:t>‹#›</a:t>
+              <a:t>‹nº›</a:t>
             </a:fld>
             <a:endParaRPr lang="pt-BR"/>
           </a:p>
@@ -2730,7 +2750,7 @@
           <a:lstStyle/>
           <a:p>
             <a:r>
-              <a:rPr lang="en-US" smtClean="0"/>
+              <a:rPr lang="en-US"/>
               <a:t>Click to edit Master title style</a:t>
             </a:r>
             <a:endParaRPr lang="en-US" dirty="0"/>
@@ -2764,38 +2784,38 @@
           <a:p>
             <a:pPr lvl="0"/>
             <a:r>
-              <a:rPr lang="en-US" smtClean="0"/>
+              <a:rPr lang="en-US"/>
               <a:t>Click to edit Master text styles</a:t>
             </a:r>
           </a:p>
           <a:p>
             <a:pPr lvl="1"/>
             <a:r>
-              <a:rPr lang="en-US" smtClean="0"/>
+              <a:rPr lang="en-US"/>
               <a:t>Second level</a:t>
             </a:r>
           </a:p>
           <a:p>
             <a:pPr lvl="2"/>
             <a:r>
-              <a:rPr lang="en-US" smtClean="0"/>
+              <a:rPr lang="en-US"/>
               <a:t>Third level</a:t>
             </a:r>
           </a:p>
           <a:p>
             <a:pPr lvl="3"/>
             <a:r>
-              <a:rPr lang="en-US" smtClean="0"/>
+              <a:rPr lang="en-US"/>
               <a:t>Fourth level</a:t>
             </a:r>
           </a:p>
           <a:p>
             <a:pPr lvl="4"/>
             <a:r>
-              <a:rPr lang="en-US" smtClean="0"/>
+              <a:rPr lang="en-US"/>
               <a:t>Fifth level</a:t>
             </a:r>
-            <a:endParaRPr lang="en-US" dirty="0" smtClean="0"/>
+            <a:endParaRPr lang="en-US" dirty="0"/>
           </a:p>
         </p:txBody>
       </p:sp>
@@ -2836,7 +2856,7 @@
           <a:p>
             <a:fld id="{8EE831F1-ED05-4BAA-8C74-2BAAB7F343BB}" type="datetimeFigureOut">
               <a:rPr lang="pt-BR" smtClean="0"/>
-              <a:t>11/06/2017</a:t>
+              <a:t>12/06/2017</a:t>
             </a:fld>
             <a:endParaRPr lang="pt-BR"/>
           </a:p>
@@ -2918,7 +2938,7 @@
           <a:p>
             <a:fld id="{EF5993D9-3239-4E1A-B177-3A3DADB6A390}" type="slidenum">
               <a:rPr lang="pt-BR" smtClean="0"/>
-              <a:t>‹#›</a:t>
+              <a:t>‹nº›</a:t>
             </a:fld>
             <a:endParaRPr lang="pt-BR"/>
           </a:p>
@@ -3375,11 +3395,11 @@
           <a:lstStyle/>
           <a:p>
             <a:r>
-              <a:rPr lang="pt-BR" sz="3600" dirty="0" smtClean="0"/>
+              <a:rPr lang="pt-BR" sz="3600" dirty="0"/>
               <a:t>Padrões de projetos</a:t>
             </a:r>
             <a:br>
-              <a:rPr lang="pt-BR" sz="3600" dirty="0" smtClean="0"/>
+              <a:rPr lang="pt-BR" sz="3600" dirty="0"/>
             </a:br>
             <a:endParaRPr lang="pt-BR" sz="3600" dirty="0"/>
           </a:p>
@@ -3408,41 +3428,40 @@
           <a:lstStyle/>
           <a:p>
             <a:r>
-              <a:rPr lang="pt-BR" dirty="0" smtClean="0"/>
+              <a:rPr lang="pt-BR" dirty="0"/>
               <a:t>Grupo:</a:t>
             </a:r>
             <a:br>
-              <a:rPr lang="pt-BR" dirty="0" smtClean="0"/>
+              <a:rPr lang="pt-BR" dirty="0"/>
             </a:br>
             <a:r>
-              <a:rPr lang="pt-BR" dirty="0" smtClean="0"/>
+              <a:rPr lang="pt-BR" dirty="0"/>
               <a:t>Bruno Félix</a:t>
             </a:r>
           </a:p>
           <a:p>
             <a:r>
-              <a:rPr lang="pt-BR" dirty="0" smtClean="0"/>
+              <a:rPr lang="pt-BR" dirty="0"/>
               <a:t>Jaasiel Tavares</a:t>
             </a:r>
           </a:p>
           <a:p>
             <a:r>
-              <a:rPr lang="pt-BR" dirty="0" smtClean="0"/>
+              <a:rPr lang="pt-BR" dirty="0"/>
               <a:t>Maikon Silva</a:t>
             </a:r>
           </a:p>
           <a:p>
             <a:r>
-              <a:rPr lang="pt-BR" dirty="0" smtClean="0"/>
+              <a:rPr lang="pt-BR" dirty="0"/>
               <a:t>Tiago José</a:t>
             </a:r>
           </a:p>
           <a:p>
             <a:r>
-              <a:rPr lang="pt-BR" dirty="0" smtClean="0"/>
+              <a:rPr lang="pt-BR" dirty="0"/>
               <a:t>Victor Luiz</a:t>
             </a:r>
-            <a:endParaRPr lang="pt-BR" dirty="0"/>
           </a:p>
         </p:txBody>
       </p:sp>
@@ -3456,13 +3475,6 @@
   <p:clrMapOvr>
     <a:masterClrMapping/>
   </p:clrMapOvr>
-  <p:timing>
-    <p:tnLst>
-      <p:par>
-        <p:cTn id="1" dur="indefinite" restart="never" nodeType="tmRoot"/>
-      </p:par>
-    </p:tnLst>
-  </p:timing>
 </p:sld>
 </file>
 
@@ -3570,10 +3582,9 @@
           <a:lstStyle/>
           <a:p>
             <a:r>
-              <a:rPr lang="pt-BR" dirty="0" smtClean="0"/>
+              <a:rPr lang="pt-BR" dirty="0"/>
               <a:t>Vantagens Builder</a:t>
             </a:r>
-            <a:endParaRPr lang="pt-BR" dirty="0"/>
           </a:p>
         </p:txBody>
       </p:sp>
@@ -3606,20 +3617,12 @@
                   <a:schemeClr val="tx1"/>
                 </a:solidFill>
               </a:rPr>
-              <a:t>Permite variar a representação interna de um produto. O objeto Builder fornece ao diretor uma interface abstrata para a construção do produto. A interface permite ao construtor ocultar a representação e a estrutura interna do produto. Ela também oculta como o produto é montado. Já que o produto é construído através de uma interface abstrata, tudo o que você tem que fazer para mudar sua representação interna é definir um novo tipo de </a:t>
-            </a:r>
-            <a:r>
-              <a:rPr lang="pt-BR" sz="2200" dirty="0" smtClean="0">
-                <a:solidFill>
-                  <a:schemeClr val="tx1"/>
-                </a:solidFill>
-              </a:rPr>
-              <a:t>contrutor.</a:t>
+              <a:t>Permite variar a representação interna de um produto. O objeto Builder fornece ao diretor uma interface abstrata para a construção do produto. A interface permite ao construtor ocultar a representação e a estrutura interna do produto. Ela também oculta como o produto é montado. Já que o produto é construído através de uma interface abstrata, tudo o que você tem que fazer para mudar sua representação interna é definir um novo tipo de contrutor.</a:t>
             </a:r>
           </a:p>
           <a:p>
             <a:pPr algn="just"/>
-            <a:endParaRPr lang="pt-BR" sz="2200" dirty="0" smtClean="0">
+            <a:endParaRPr lang="pt-BR" sz="2200" dirty="0">
               <a:solidFill>
                 <a:schemeClr val="tx1"/>
               </a:solidFill>
@@ -3628,26 +3631,13 @@
           <a:p>
             <a:pPr algn="just"/>
             <a:r>
-              <a:rPr lang="pt-BR" sz="2200" dirty="0" smtClean="0">
-                <a:solidFill>
-                  <a:schemeClr val="tx1"/>
-                </a:solidFill>
-              </a:rPr>
-              <a:t>Isola </a:t>
-            </a:r>
-            <a:r>
               <a:rPr lang="pt-BR" sz="2200" dirty="0">
                 <a:solidFill>
                   <a:schemeClr val="tx1"/>
                 </a:solidFill>
               </a:rPr>
-              <a:t>o código para construção e representação: O padrão Builder melhora a modularidade pelo encapsulamento da forma como um objeto complexo é construído e representado. </a:t>
-            </a:r>
-            <a:endParaRPr lang="pt-BR" sz="2200" dirty="0" smtClean="0">
-              <a:solidFill>
-                <a:schemeClr val="tx1"/>
-              </a:solidFill>
-            </a:endParaRPr>
+              <a:t>Isola o código para construção e representação: O padrão Builder melhora a modularidade pelo encapsulamento da forma como um objeto complexo é construído e representado. </a:t>
+            </a:r>
           </a:p>
         </p:txBody>
       </p:sp>
@@ -3661,13 +3651,6 @@
   <p:clrMapOvr>
     <a:masterClrMapping/>
   </p:clrMapOvr>
-  <p:timing>
-    <p:tnLst>
-      <p:par>
-        <p:cTn id="1" dur="indefinite" restart="never" nodeType="tmRoot"/>
-      </p:par>
-    </p:tnLst>
-  </p:timing>
 </p:sld>
 </file>
 
@@ -3704,10 +3687,9 @@
           <a:lstStyle/>
           <a:p>
             <a:r>
-              <a:rPr lang="pt-BR" dirty="0" smtClean="0"/>
+              <a:rPr lang="pt-BR" dirty="0"/>
               <a:t>Vantagens Builder</a:t>
             </a:r>
-            <a:endParaRPr lang="pt-BR" dirty="0"/>
           </a:p>
         </p:txBody>
       </p:sp>
@@ -3735,71 +3717,34 @@
           <a:p>
             <a:pPr algn="just"/>
             <a:r>
-              <a:rPr lang="pt-BR" sz="1900" dirty="0" smtClean="0">
-                <a:solidFill>
-                  <a:schemeClr val="tx1"/>
-                </a:solidFill>
-              </a:rPr>
-              <a:t>Os </a:t>
-            </a:r>
-            <a:r>
               <a:rPr lang="pt-BR" sz="1900" dirty="0">
                 <a:solidFill>
                   <a:schemeClr val="tx1"/>
                 </a:solidFill>
               </a:rPr>
-              <a:t>clientes nada necessitam saber sobre as classes que definem a estrutura interna do produto, tais classes não aparecem na interface do Builder. </a:t>
-            </a:r>
-            <a:endParaRPr lang="pt-BR" sz="1900" dirty="0" smtClean="0">
-              <a:solidFill>
-                <a:schemeClr val="tx1"/>
-              </a:solidFill>
-            </a:endParaRPr>
+              <a:t>Os clientes nada necessitam saber sobre as classes que definem a estrutura interna do produto, tais classes não aparecem na interface do Builder. </a:t>
+            </a:r>
           </a:p>
           <a:p>
             <a:pPr algn="just"/>
             <a:r>
-              <a:rPr lang="pt-BR" sz="1900" dirty="0" smtClean="0">
-                <a:solidFill>
-                  <a:schemeClr val="tx1"/>
-                </a:solidFill>
-              </a:rPr>
-              <a:t>Cada </a:t>
-            </a:r>
-            <a:r>
               <a:rPr lang="pt-BR" sz="1900" dirty="0">
                 <a:solidFill>
                   <a:schemeClr val="tx1"/>
                 </a:solidFill>
               </a:rPr>
-              <a:t>ConcreteBuilder contém todo o código para criar e montar um tipo de produto específico. O código é escrito somente uma vez, então, diferentes Directors podem reutilizá-lo para construir variantes de Product com o mesmo conjunto de </a:t>
-            </a:r>
-            <a:r>
-              <a:rPr lang="pt-BR" sz="1900" dirty="0" smtClean="0">
-                <a:solidFill>
-                  <a:schemeClr val="tx1"/>
-                </a:solidFill>
-              </a:rPr>
-              <a:t>partes.</a:t>
+              <a:t>Cada ConcreteBuilder contém todo o código para criar e montar um tipo de produto específico. O código é escrito somente uma vez, então, diferentes Directors podem reutilizá-lo para construir variantes de Product com o mesmo conjunto de partes.</a:t>
             </a:r>
           </a:p>
           <a:p>
             <a:pPr algn="just"/>
             <a:r>
-              <a:rPr lang="pt-BR" sz="1900" dirty="0" smtClean="0">
-                <a:solidFill>
-                  <a:schemeClr val="tx1"/>
-                </a:solidFill>
-              </a:rPr>
-              <a:t>Oferece </a:t>
-            </a:r>
-            <a:r>
               <a:rPr lang="pt-BR" sz="1900" dirty="0">
                 <a:solidFill>
                   <a:schemeClr val="tx1"/>
                 </a:solidFill>
               </a:rPr>
-              <a:t>um controle mais fino sobre o processo de construção: Ao contrário de padrões de criação que constroem produtos de uma só vez, o Builder constrói o produto passo a passo sobre o controle do diretor. Somente quando o produto está terminado o diretor o recupera do construtor. Daí a interface de Builder refletir o processo de construção do produto mais explicitamente do que outros padrões de criação. Isso dá um controle mais fino sobre o processo de construção e, consequentemente, da estrutura interna do produto resultante.</a:t>
+              <a:t>Oferece um controle mais fino sobre o processo de construção: Ao contrário de padrões de criação que constroem produtos de uma só vez, o Builder constrói o produto passo a passo sobre o controle do diretor. Somente quando o produto está terminado o diretor o recupera do construtor. Daí a interface de Builder refletir o processo de construção do produto mais explicitamente do que outros padrões de criação. Isso dá um controle mais fino sobre o processo de construção e, consequentemente, da estrutura interna do produto resultante.</a:t>
             </a:r>
           </a:p>
         </p:txBody>
@@ -3814,13 +3759,6 @@
   <p:clrMapOvr>
     <a:masterClrMapping/>
   </p:clrMapOvr>
-  <p:timing>
-    <p:tnLst>
-      <p:par>
-        <p:cTn id="1" dur="indefinite" restart="never" nodeType="tmRoot"/>
-      </p:par>
-    </p:tnLst>
-  </p:timing>
 </p:sld>
 </file>
 
@@ -3857,10 +3795,9 @@
           <a:lstStyle/>
           <a:p>
             <a:r>
-              <a:rPr lang="pt-BR" dirty="0" smtClean="0"/>
+              <a:rPr lang="pt-BR" dirty="0"/>
               <a:t>Desvantagens Builder</a:t>
             </a:r>
-            <a:endParaRPr lang="pt-BR" dirty="0"/>
           </a:p>
         </p:txBody>
       </p:sp>
@@ -3888,23 +3825,7 @@
                   <a:schemeClr val="tx1"/>
                 </a:solidFill>
               </a:rPr>
-              <a:t>Requer criar </a:t>
-            </a:r>
-            <a:r>
-              <a:rPr lang="pt-BR" dirty="0" smtClean="0">
-                <a:solidFill>
-                  <a:schemeClr val="tx1"/>
-                </a:solidFill>
-              </a:rPr>
-              <a:t>uma classe que implemente o builder específico </a:t>
-            </a:r>
-            <a:r>
-              <a:rPr lang="pt-BR" dirty="0">
-                <a:solidFill>
-                  <a:schemeClr val="tx1"/>
-                </a:solidFill>
-              </a:rPr>
-              <a:t>para cada instância diferente do produto.</a:t>
+              <a:t>Requer criar uma classe que implemente o builder específico para cada instância diferente do produto.</a:t>
             </a:r>
           </a:p>
         </p:txBody>
@@ -3919,13 +3840,577 @@
   <p:clrMapOvr>
     <a:masterClrMapping/>
   </p:clrMapOvr>
-  <p:timing>
-    <p:tnLst>
-      <p:par>
-        <p:cTn id="1" dur="indefinite" restart="never" nodeType="tmRoot"/>
-      </p:par>
-    </p:tnLst>
-  </p:timing>
+</p:sld>
+</file>
+
+<file path=ppt/slides/slide14.xml><?xml version="1.0" encoding="utf-8"?>
+<p:sld xmlns:a="http://schemas.openxmlformats.org/drawingml/2006/main" xmlns:r="http://schemas.openxmlformats.org/officeDocument/2006/relationships" xmlns:p="http://schemas.openxmlformats.org/presentationml/2006/main">
+  <p:cSld>
+    <p:spTree>
+      <p:nvGrpSpPr>
+        <p:cNvPr id="1" name=""/>
+        <p:cNvGrpSpPr/>
+        <p:nvPr/>
+      </p:nvGrpSpPr>
+      <p:grpSpPr>
+        <a:xfrm>
+          <a:off x="0" y="0"/>
+          <a:ext cx="0" cy="0"/>
+          <a:chOff x="0" y="0"/>
+          <a:chExt cx="0" cy="0"/>
+        </a:xfrm>
+      </p:grpSpPr>
+      <p:sp>
+        <p:nvSpPr>
+          <p:cNvPr id="2" name="Title 1"/>
+          <p:cNvSpPr>
+            <a:spLocks noGrp="1"/>
+          </p:cNvSpPr>
+          <p:nvPr>
+            <p:ph type="title"/>
+          </p:nvPr>
+        </p:nvSpPr>
+        <p:spPr/>
+        <p:txBody>
+          <a:bodyPr/>
+          <a:lstStyle/>
+          <a:p>
+            <a:r>
+              <a:rPr lang="pt-BR" dirty="0" err="1"/>
+              <a:t>Facade</a:t>
+            </a:r>
+            <a:endParaRPr lang="pt-BR" dirty="0"/>
+          </a:p>
+        </p:txBody>
+      </p:sp>
+      <p:sp>
+        <p:nvSpPr>
+          <p:cNvPr id="3" name="Content Placeholder 2"/>
+          <p:cNvSpPr>
+            <a:spLocks noGrp="1"/>
+          </p:cNvSpPr>
+          <p:nvPr>
+            <p:ph idx="1"/>
+          </p:nvPr>
+        </p:nvSpPr>
+        <p:spPr/>
+        <p:txBody>
+          <a:bodyPr>
+            <a:normAutofit fontScale="92500" lnSpcReduction="10000"/>
+          </a:bodyPr>
+          <a:lstStyle/>
+          <a:p>
+            <a:r>
+              <a:rPr lang="pt-BR" dirty="0">
+                <a:solidFill>
+                  <a:schemeClr val="tx1"/>
+                </a:solidFill>
+              </a:rPr>
+              <a:t>Padrão de projeto de design de software</a:t>
+            </a:r>
+          </a:p>
+          <a:p>
+            <a:endParaRPr lang="pt-BR" dirty="0">
+              <a:solidFill>
+                <a:schemeClr val="tx1"/>
+              </a:solidFill>
+            </a:endParaRPr>
+          </a:p>
+          <a:p>
+            <a:r>
+              <a:rPr lang="pt-BR" dirty="0">
+                <a:solidFill>
+                  <a:schemeClr val="tx1"/>
+                </a:solidFill>
+              </a:rPr>
+              <a:t>Tem como propósito promover uma interface unificada para um conjunto de interfaces de um subsistema. Dessa forma, é definida uma interface de alto nível que torna um subsistema mais fácil de ser utilizado/acessado.</a:t>
+            </a:r>
+          </a:p>
+          <a:p>
+            <a:endParaRPr lang="pt-BR" dirty="0">
+              <a:solidFill>
+                <a:schemeClr val="tx1"/>
+              </a:solidFill>
+            </a:endParaRPr>
+          </a:p>
+          <a:p>
+            <a:r>
+              <a:rPr lang="pt-BR" dirty="0">
+                <a:solidFill>
+                  <a:schemeClr val="tx1"/>
+                </a:solidFill>
+              </a:rPr>
+              <a:t>Seu objetivo é implementar uma forma de interagir com um sistema que seja mais fácil que o antigo, com a intenção de usar um subconjunto do sistema em questão. Ou seja, busca simplificar o uso de um sistema existente a partir de uma interface</a:t>
+            </a:r>
+          </a:p>
+        </p:txBody>
+      </p:sp>
+    </p:spTree>
+    <p:extLst>
+      <p:ext uri="{BB962C8B-B14F-4D97-AF65-F5344CB8AC3E}">
+        <p14:creationId xmlns:p14="http://schemas.microsoft.com/office/powerpoint/2010/main" val="2124802612"/>
+      </p:ext>
+    </p:extLst>
+  </p:cSld>
+  <p:clrMapOvr>
+    <a:masterClrMapping/>
+  </p:clrMapOvr>
+</p:sld>
+</file>
+
+<file path=ppt/slides/slide15.xml><?xml version="1.0" encoding="utf-8"?>
+<p:sld xmlns:a="http://schemas.openxmlformats.org/drawingml/2006/main" xmlns:r="http://schemas.openxmlformats.org/officeDocument/2006/relationships" xmlns:p="http://schemas.openxmlformats.org/presentationml/2006/main">
+  <p:cSld>
+    <p:spTree>
+      <p:nvGrpSpPr>
+        <p:cNvPr id="1" name=""/>
+        <p:cNvGrpSpPr/>
+        <p:nvPr/>
+      </p:nvGrpSpPr>
+      <p:grpSpPr>
+        <a:xfrm>
+          <a:off x="0" y="0"/>
+          <a:ext cx="0" cy="0"/>
+          <a:chOff x="0" y="0"/>
+          <a:chExt cx="0" cy="0"/>
+        </a:xfrm>
+      </p:grpSpPr>
+      <p:sp>
+        <p:nvSpPr>
+          <p:cNvPr id="2" name="Title 1"/>
+          <p:cNvSpPr>
+            <a:spLocks noGrp="1"/>
+          </p:cNvSpPr>
+          <p:nvPr>
+            <p:ph type="title"/>
+          </p:nvPr>
+        </p:nvSpPr>
+        <p:spPr/>
+        <p:txBody>
+          <a:bodyPr/>
+          <a:lstStyle/>
+          <a:p>
+            <a:r>
+              <a:rPr lang="pt-BR" dirty="0"/>
+              <a:t>Estrutura Antes</a:t>
+            </a:r>
+          </a:p>
+        </p:txBody>
+      </p:sp>
+      <p:sp>
+        <p:nvSpPr>
+          <p:cNvPr id="3" name="Content Placeholder 2"/>
+          <p:cNvSpPr>
+            <a:spLocks noGrp="1"/>
+          </p:cNvSpPr>
+          <p:nvPr>
+            <p:ph idx="1"/>
+          </p:nvPr>
+        </p:nvSpPr>
+        <p:spPr>
+          <a:xfrm>
+            <a:off x="467544" y="1772816"/>
+            <a:ext cx="8229600" cy="4525963"/>
+          </a:xfrm>
+        </p:spPr>
+        <p:txBody>
+          <a:bodyPr>
+            <a:normAutofit/>
+          </a:bodyPr>
+          <a:lstStyle/>
+          <a:p>
+            <a:pPr marL="0" indent="0">
+              <a:buNone/>
+            </a:pPr>
+            <a:endParaRPr lang="pt-BR" dirty="0"/>
+          </a:p>
+          <a:p>
+            <a:endParaRPr lang="pt-BR" dirty="0"/>
+          </a:p>
+        </p:txBody>
+      </p:sp>
+      <p:pic>
+        <p:nvPicPr>
+          <p:cNvPr id="5" name="Imagem 4">
+            <a:extLst>
+              <a:ext uri="{FF2B5EF4-FFF2-40B4-BE49-F238E27FC236}">
+                <a16:creationId xmlns:a16="http://schemas.microsoft.com/office/drawing/2014/main" id="{6E21660A-4590-4BDF-9CA9-A33099FA11CC}"/>
+              </a:ext>
+            </a:extLst>
+          </p:cNvPr>
+          <p:cNvPicPr>
+            <a:picLocks noChangeAspect="1"/>
+          </p:cNvPicPr>
+          <p:nvPr/>
+        </p:nvPicPr>
+        <p:blipFill>
+          <a:blip r:embed="rId2">
+            <a:extLst>
+              <a:ext uri="{28A0092B-C50C-407E-A947-70E740481C1C}">
+                <a14:useLocalDpi xmlns:a14="http://schemas.microsoft.com/office/drawing/2010/main" val="0"/>
+              </a:ext>
+            </a:extLst>
+          </a:blip>
+          <a:stretch>
+            <a:fillRect/>
+          </a:stretch>
+        </p:blipFill>
+        <p:spPr>
+          <a:xfrm>
+            <a:off x="152400" y="1652587"/>
+            <a:ext cx="8839200" cy="4296693"/>
+          </a:xfrm>
+          <a:prstGeom prst="rect">
+            <a:avLst/>
+          </a:prstGeom>
+        </p:spPr>
+      </p:pic>
+    </p:spTree>
+    <p:extLst>
+      <p:ext uri="{BB962C8B-B14F-4D97-AF65-F5344CB8AC3E}">
+        <p14:creationId xmlns:p14="http://schemas.microsoft.com/office/powerpoint/2010/main" val="2708588025"/>
+      </p:ext>
+    </p:extLst>
+  </p:cSld>
+  <p:clrMapOvr>
+    <a:masterClrMapping/>
+  </p:clrMapOvr>
+</p:sld>
+</file>
+
+<file path=ppt/slides/slide16.xml><?xml version="1.0" encoding="utf-8"?>
+<p:sld xmlns:a="http://schemas.openxmlformats.org/drawingml/2006/main" xmlns:r="http://schemas.openxmlformats.org/officeDocument/2006/relationships" xmlns:p="http://schemas.openxmlformats.org/presentationml/2006/main">
+  <p:cSld>
+    <p:spTree>
+      <p:nvGrpSpPr>
+        <p:cNvPr id="1" name=""/>
+        <p:cNvGrpSpPr/>
+        <p:nvPr/>
+      </p:nvGrpSpPr>
+      <p:grpSpPr>
+        <a:xfrm>
+          <a:off x="0" y="0"/>
+          <a:ext cx="0" cy="0"/>
+          <a:chOff x="0" y="0"/>
+          <a:chExt cx="0" cy="0"/>
+        </a:xfrm>
+      </p:grpSpPr>
+      <p:sp>
+        <p:nvSpPr>
+          <p:cNvPr id="2" name="Title 1"/>
+          <p:cNvSpPr>
+            <a:spLocks noGrp="1"/>
+          </p:cNvSpPr>
+          <p:nvPr>
+            <p:ph type="title"/>
+          </p:nvPr>
+        </p:nvSpPr>
+        <p:spPr/>
+        <p:txBody>
+          <a:bodyPr/>
+          <a:lstStyle/>
+          <a:p>
+            <a:r>
+              <a:rPr lang="pt-BR" dirty="0"/>
+              <a:t>Estrutura Atual</a:t>
+            </a:r>
+          </a:p>
+        </p:txBody>
+      </p:sp>
+      <p:sp>
+        <p:nvSpPr>
+          <p:cNvPr id="3" name="Content Placeholder 2"/>
+          <p:cNvSpPr>
+            <a:spLocks noGrp="1"/>
+          </p:cNvSpPr>
+          <p:nvPr>
+            <p:ph idx="1"/>
+          </p:nvPr>
+        </p:nvSpPr>
+        <p:spPr>
+          <a:xfrm>
+            <a:off x="467544" y="1772816"/>
+            <a:ext cx="8229600" cy="4525963"/>
+          </a:xfrm>
+        </p:spPr>
+        <p:txBody>
+          <a:bodyPr>
+            <a:normAutofit/>
+          </a:bodyPr>
+          <a:lstStyle/>
+          <a:p>
+            <a:pPr marL="0" indent="0">
+              <a:buNone/>
+            </a:pPr>
+            <a:endParaRPr lang="pt-BR" dirty="0"/>
+          </a:p>
+          <a:p>
+            <a:endParaRPr lang="pt-BR" dirty="0"/>
+          </a:p>
+        </p:txBody>
+      </p:sp>
+      <p:pic>
+        <p:nvPicPr>
+          <p:cNvPr id="6" name="Imagem 5">
+            <a:extLst>
+              <a:ext uri="{FF2B5EF4-FFF2-40B4-BE49-F238E27FC236}">
+                <a16:creationId xmlns:a16="http://schemas.microsoft.com/office/drawing/2014/main" id="{0B7272D5-577B-4887-843A-A2CEB72221B7}"/>
+              </a:ext>
+            </a:extLst>
+          </p:cNvPr>
+          <p:cNvPicPr>
+            <a:picLocks noChangeAspect="1"/>
+          </p:cNvPicPr>
+          <p:nvPr/>
+        </p:nvPicPr>
+        <p:blipFill>
+          <a:blip r:embed="rId2">
+            <a:extLst>
+              <a:ext uri="{28A0092B-C50C-407E-A947-70E740481C1C}">
+                <a14:useLocalDpi xmlns:a14="http://schemas.microsoft.com/office/drawing/2010/main" val="0"/>
+              </a:ext>
+            </a:extLst>
+          </a:blip>
+          <a:stretch>
+            <a:fillRect/>
+          </a:stretch>
+        </p:blipFill>
+        <p:spPr>
+          <a:xfrm>
+            <a:off x="457200" y="1602353"/>
+            <a:ext cx="8229599" cy="4343400"/>
+          </a:xfrm>
+          <a:prstGeom prst="rect">
+            <a:avLst/>
+          </a:prstGeom>
+        </p:spPr>
+      </p:pic>
+    </p:spTree>
+    <p:extLst>
+      <p:ext uri="{BB962C8B-B14F-4D97-AF65-F5344CB8AC3E}">
+        <p14:creationId xmlns:p14="http://schemas.microsoft.com/office/powerpoint/2010/main" val="2349198731"/>
+      </p:ext>
+    </p:extLst>
+  </p:cSld>
+  <p:clrMapOvr>
+    <a:masterClrMapping/>
+  </p:clrMapOvr>
+</p:sld>
+</file>
+
+<file path=ppt/slides/slide17.xml><?xml version="1.0" encoding="utf-8"?>
+<p:sld xmlns:a="http://schemas.openxmlformats.org/drawingml/2006/main" xmlns:r="http://schemas.openxmlformats.org/officeDocument/2006/relationships" xmlns:p="http://schemas.openxmlformats.org/presentationml/2006/main">
+  <p:cSld>
+    <p:spTree>
+      <p:nvGrpSpPr>
+        <p:cNvPr id="1" name=""/>
+        <p:cNvGrpSpPr/>
+        <p:nvPr/>
+      </p:nvGrpSpPr>
+      <p:grpSpPr>
+        <a:xfrm>
+          <a:off x="0" y="0"/>
+          <a:ext cx="0" cy="0"/>
+          <a:chOff x="0" y="0"/>
+          <a:chExt cx="0" cy="0"/>
+        </a:xfrm>
+      </p:grpSpPr>
+      <p:sp>
+        <p:nvSpPr>
+          <p:cNvPr id="2" name="Title 1"/>
+          <p:cNvSpPr>
+            <a:spLocks noGrp="1"/>
+          </p:cNvSpPr>
+          <p:nvPr>
+            <p:ph type="title"/>
+          </p:nvPr>
+        </p:nvSpPr>
+        <p:spPr/>
+        <p:txBody>
+          <a:bodyPr/>
+          <a:lstStyle/>
+          <a:p>
+            <a:r>
+              <a:rPr lang="pt-BR" dirty="0"/>
+              <a:t>Vantagens </a:t>
+            </a:r>
+            <a:r>
+              <a:rPr lang="pt-BR" dirty="0" err="1"/>
+              <a:t>Facade</a:t>
+            </a:r>
+            <a:endParaRPr lang="pt-BR" dirty="0"/>
+          </a:p>
+        </p:txBody>
+      </p:sp>
+      <p:sp>
+        <p:nvSpPr>
+          <p:cNvPr id="3" name="Content Placeholder 2"/>
+          <p:cNvSpPr>
+            <a:spLocks noGrp="1"/>
+          </p:cNvSpPr>
+          <p:nvPr>
+            <p:ph idx="1"/>
+          </p:nvPr>
+        </p:nvSpPr>
+        <p:spPr>
+          <a:xfrm>
+            <a:off x="467544" y="1772816"/>
+            <a:ext cx="8229600" cy="4525963"/>
+          </a:xfrm>
+        </p:spPr>
+        <p:txBody>
+          <a:bodyPr>
+            <a:normAutofit/>
+          </a:bodyPr>
+          <a:lstStyle/>
+          <a:p>
+            <a:r>
+              <a:rPr lang="pt-BR" dirty="0">
+                <a:solidFill>
+                  <a:schemeClr val="tx1"/>
+                </a:solidFill>
+              </a:rPr>
+              <a:t>Torna o sistema mais fácil de se usar, protegendo os clientes dos componentes do sistema, reduzindo o número de objetos que terão que lidar.</a:t>
+            </a:r>
+          </a:p>
+          <a:p>
+            <a:endParaRPr lang="pt-BR" dirty="0">
+              <a:solidFill>
+                <a:schemeClr val="tx1"/>
+              </a:solidFill>
+            </a:endParaRPr>
+          </a:p>
+          <a:p>
+            <a:r>
+              <a:rPr lang="pt-BR" dirty="0">
+                <a:solidFill>
+                  <a:schemeClr val="tx1"/>
+                </a:solidFill>
+              </a:rPr>
+              <a:t>Promove fraco/pouco acoplamento entre os subsistemas e seus clientes.</a:t>
+            </a:r>
+          </a:p>
+          <a:p>
+            <a:endParaRPr lang="pt-BR" dirty="0">
+              <a:solidFill>
+                <a:schemeClr val="tx1"/>
+              </a:solidFill>
+            </a:endParaRPr>
+          </a:p>
+          <a:p>
+            <a:r>
+              <a:rPr lang="pt-BR" dirty="0">
+                <a:solidFill>
+                  <a:schemeClr val="tx1"/>
+                </a:solidFill>
+              </a:rPr>
+              <a:t>Não evita que as aplicações possam acessar as subclasses diretamente, pode-se escolher entre a facilidade de uso ou a generalidade.</a:t>
+            </a:r>
+          </a:p>
+        </p:txBody>
+      </p:sp>
+    </p:spTree>
+    <p:extLst>
+      <p:ext uri="{BB962C8B-B14F-4D97-AF65-F5344CB8AC3E}">
+        <p14:creationId xmlns:p14="http://schemas.microsoft.com/office/powerpoint/2010/main" val="2070413288"/>
+      </p:ext>
+    </p:extLst>
+  </p:cSld>
+  <p:clrMapOvr>
+    <a:masterClrMapping/>
+  </p:clrMapOvr>
+</p:sld>
+</file>
+
+<file path=ppt/slides/slide18.xml><?xml version="1.0" encoding="utf-8"?>
+<p:sld xmlns:a="http://schemas.openxmlformats.org/drawingml/2006/main" xmlns:r="http://schemas.openxmlformats.org/officeDocument/2006/relationships" xmlns:p="http://schemas.openxmlformats.org/presentationml/2006/main">
+  <p:cSld>
+    <p:spTree>
+      <p:nvGrpSpPr>
+        <p:cNvPr id="1" name=""/>
+        <p:cNvGrpSpPr/>
+        <p:nvPr/>
+      </p:nvGrpSpPr>
+      <p:grpSpPr>
+        <a:xfrm>
+          <a:off x="0" y="0"/>
+          <a:ext cx="0" cy="0"/>
+          <a:chOff x="0" y="0"/>
+          <a:chExt cx="0" cy="0"/>
+        </a:xfrm>
+      </p:grpSpPr>
+      <p:sp>
+        <p:nvSpPr>
+          <p:cNvPr id="2" name="Title 1"/>
+          <p:cNvSpPr>
+            <a:spLocks noGrp="1"/>
+          </p:cNvSpPr>
+          <p:nvPr>
+            <p:ph type="title"/>
+          </p:nvPr>
+        </p:nvSpPr>
+        <p:spPr/>
+        <p:txBody>
+          <a:bodyPr/>
+          <a:lstStyle/>
+          <a:p>
+            <a:r>
+              <a:rPr lang="pt-BR" dirty="0"/>
+              <a:t>Desvantagens </a:t>
+            </a:r>
+            <a:r>
+              <a:rPr lang="pt-BR" dirty="0" err="1"/>
+              <a:t>Facade</a:t>
+            </a:r>
+            <a:endParaRPr lang="pt-BR" dirty="0"/>
+          </a:p>
+        </p:txBody>
+      </p:sp>
+      <p:pic>
+        <p:nvPicPr>
+          <p:cNvPr id="5" name="Espaço Reservado para Conteúdo 4">
+            <a:extLst>
+              <a:ext uri="{FF2B5EF4-FFF2-40B4-BE49-F238E27FC236}">
+                <a16:creationId xmlns:a16="http://schemas.microsoft.com/office/drawing/2014/main" id="{C7158B15-0B5E-4179-890E-07A1B9A4C7F1}"/>
+              </a:ext>
+            </a:extLst>
+          </p:cNvPr>
+          <p:cNvPicPr>
+            <a:picLocks noGrp="1" noChangeAspect="1"/>
+          </p:cNvPicPr>
+          <p:nvPr>
+            <p:ph idx="1"/>
+          </p:nvPr>
+        </p:nvPicPr>
+        <p:blipFill>
+          <a:blip r:embed="rId2">
+            <a:extLst>
+              <a:ext uri="{28A0092B-C50C-407E-A947-70E740481C1C}">
+                <a14:useLocalDpi xmlns:a14="http://schemas.microsoft.com/office/drawing/2010/main" val="0"/>
+              </a:ext>
+            </a:extLst>
+          </a:blip>
+          <a:stretch>
+            <a:fillRect/>
+          </a:stretch>
+        </p:blipFill>
+        <p:spPr>
+          <a:xfrm>
+            <a:off x="2411760" y="1961331"/>
+            <a:ext cx="3915941" cy="3915941"/>
+          </a:xfrm>
+        </p:spPr>
+      </p:pic>
+    </p:spTree>
+    <p:extLst>
+      <p:ext uri="{BB962C8B-B14F-4D97-AF65-F5344CB8AC3E}">
+        <p14:creationId xmlns:p14="http://schemas.microsoft.com/office/powerpoint/2010/main" val="579172413"/>
+      </p:ext>
+    </p:extLst>
+  </p:cSld>
+  <p:clrMapOvr>
+    <a:masterClrMapping/>
+  </p:clrMapOvr>
 </p:sld>
 </file>
 
@@ -3967,10 +4452,9 @@
           <a:lstStyle/>
           <a:p>
             <a:r>
-              <a:rPr lang="pt-BR" dirty="0" smtClean="0"/>
+              <a:rPr lang="pt-BR" dirty="0"/>
               <a:t>Sumário</a:t>
             </a:r>
-            <a:endParaRPr lang="pt-BR" dirty="0"/>
           </a:p>
         </p:txBody>
       </p:sp>
@@ -3997,7 +4481,7 @@
           <a:lstStyle/>
           <a:p>
             <a:r>
-              <a:rPr lang="pt-BR" dirty="0" smtClean="0">
+              <a:rPr lang="pt-BR" dirty="0">
                 <a:solidFill>
                   <a:schemeClr val="tx1"/>
                 </a:solidFill>
@@ -4008,7 +4492,7 @@
           <a:p>
             <a:pPr lvl="1"/>
             <a:r>
-              <a:rPr lang="pt-BR" dirty="0" smtClean="0">
+              <a:rPr lang="pt-BR" dirty="0">
                 <a:solidFill>
                   <a:schemeClr val="tx1"/>
                 </a:solidFill>
@@ -4019,7 +4503,7 @@
           <a:p>
             <a:pPr lvl="1"/>
             <a:r>
-              <a:rPr lang="pt-BR" dirty="0" smtClean="0">
+              <a:rPr lang="pt-BR" dirty="0">
                 <a:solidFill>
                   <a:schemeClr val="tx1"/>
                 </a:solidFill>
@@ -4030,7 +4514,7 @@
           <a:p>
             <a:pPr lvl="1"/>
             <a:r>
-              <a:rPr lang="pt-BR" dirty="0" smtClean="0">
+              <a:rPr lang="pt-BR" dirty="0">
                 <a:solidFill>
                   <a:schemeClr val="tx1"/>
                 </a:solidFill>
@@ -4041,20 +4525,12 @@
           <a:p>
             <a:pPr lvl="1"/>
             <a:r>
-              <a:rPr lang="pt-BR" dirty="0" smtClean="0">
+              <a:rPr lang="pt-BR" dirty="0">
                 <a:solidFill>
                   <a:schemeClr val="tx1"/>
                 </a:solidFill>
               </a:rPr>
               <a:t>Desvantagens;</a:t>
-            </a:r>
-            <a:r>
-              <a:rPr lang="pt-BR" dirty="0">
-                <a:solidFill>
-                  <a:schemeClr val="tx1"/>
-                </a:solidFill>
-              </a:rPr>
-              <a:t/>
             </a:r>
             <a:br>
               <a:rPr lang="pt-BR" dirty="0">
@@ -4063,7 +4539,7 @@
                 </a:solidFill>
               </a:rPr>
             </a:br>
-            <a:endParaRPr lang="pt-BR" dirty="0" smtClean="0">
+            <a:endParaRPr lang="pt-BR" dirty="0">
               <a:solidFill>
                 <a:schemeClr val="tx1"/>
               </a:solidFill>
@@ -4071,7 +4547,7 @@
           </a:p>
           <a:p>
             <a:r>
-              <a:rPr lang="pt-BR" dirty="0" smtClean="0">
+              <a:rPr lang="pt-BR" dirty="0">
                 <a:solidFill>
                   <a:schemeClr val="tx1"/>
                 </a:solidFill>
@@ -4104,20 +4580,12 @@
           <a:p>
             <a:pPr lvl="1"/>
             <a:r>
-              <a:rPr lang="pt-BR" dirty="0" smtClean="0">
-                <a:solidFill>
-                  <a:schemeClr val="tx1"/>
-                </a:solidFill>
-              </a:rPr>
-              <a:t>Vantagens</a:t>
-            </a:r>
-            <a:r>
               <a:rPr lang="pt-BR" dirty="0">
                 <a:solidFill>
                   <a:schemeClr val="tx1"/>
                 </a:solidFill>
               </a:rPr>
-              <a:t>;</a:t>
+              <a:t>Vantagens;</a:t>
             </a:r>
           </a:p>
           <a:p>
@@ -4137,7 +4605,7 @@
                 </a:solidFill>
               </a:rPr>
             </a:br>
-            <a:endParaRPr lang="pt-BR" dirty="0" smtClean="0">
+            <a:endParaRPr lang="pt-BR" dirty="0">
               <a:solidFill>
                 <a:schemeClr val="tx1"/>
               </a:solidFill>
@@ -4145,7 +4613,7 @@
           </a:p>
           <a:p>
             <a:r>
-              <a:rPr lang="pt-BR" dirty="0" smtClean="0">
+              <a:rPr lang="pt-BR" dirty="0">
                 <a:solidFill>
                   <a:schemeClr val="tx1"/>
                 </a:solidFill>
@@ -4178,20 +4646,12 @@
           <a:p>
             <a:pPr lvl="1"/>
             <a:r>
-              <a:rPr lang="pt-BR" dirty="0" smtClean="0">
-                <a:solidFill>
-                  <a:schemeClr val="tx1"/>
-                </a:solidFill>
-              </a:rPr>
-              <a:t>Vantagens</a:t>
-            </a:r>
-            <a:r>
               <a:rPr lang="pt-BR" dirty="0">
                 <a:solidFill>
                   <a:schemeClr val="tx1"/>
                 </a:solidFill>
               </a:rPr>
-              <a:t>;</a:t>
+              <a:t>Vantagens;</a:t>
             </a:r>
           </a:p>
           <a:p>
@@ -4217,13 +4677,6 @@
   <p:clrMapOvr>
     <a:masterClrMapping/>
   </p:clrMapOvr>
-  <p:timing>
-    <p:tnLst>
-      <p:par>
-        <p:cTn id="1" dur="indefinite" restart="never" nodeType="tmRoot"/>
-      </p:par>
-    </p:tnLst>
-  </p:timing>
 </p:sld>
 </file>
 
@@ -4260,10 +4713,9 @@
           <a:lstStyle/>
           <a:p>
             <a:r>
-              <a:rPr lang="pt-BR" dirty="0" smtClean="0"/>
+              <a:rPr lang="pt-BR" dirty="0"/>
               <a:t>Builder</a:t>
             </a:r>
-            <a:endParaRPr lang="pt-BR" dirty="0"/>
           </a:p>
         </p:txBody>
       </p:sp>
@@ -4283,7 +4735,7 @@
           <a:lstStyle/>
           <a:p>
             <a:r>
-              <a:rPr lang="pt-BR" dirty="0" smtClean="0">
+              <a:rPr lang="pt-BR" dirty="0">
                 <a:solidFill>
                   <a:schemeClr val="tx1"/>
                 </a:solidFill>
@@ -4292,50 +4744,21 @@
             </a:r>
           </a:p>
           <a:p>
-            <a:endParaRPr lang="pt-BR" dirty="0" smtClean="0">
-              <a:solidFill>
-                <a:schemeClr val="tx1"/>
-              </a:solidFill>
-            </a:endParaRPr>
-          </a:p>
-          <a:p>
-            <a:r>
-              <a:rPr lang="pt-BR" dirty="0">
-                <a:solidFill>
-                  <a:schemeClr val="tx1"/>
-                </a:solidFill>
-              </a:rPr>
-              <a:t>permite a separação da construção de um objeto complexo da sua representação, de forma que o mesmo processo de construção possa criar diferentes </a:t>
-            </a:r>
-            <a:r>
-              <a:rPr lang="pt-BR" dirty="0" smtClean="0">
-                <a:solidFill>
-                  <a:schemeClr val="tx1"/>
-                </a:solidFill>
-              </a:rPr>
-              <a:t>representações, ou seja, permite </a:t>
-            </a:r>
-            <a:r>
-              <a:rPr lang="pt-BR" dirty="0">
-                <a:solidFill>
-                  <a:schemeClr val="tx1"/>
-                </a:solidFill>
-              </a:rPr>
-              <a:t>separar os passos de construção de um objeto em pequenos </a:t>
-            </a:r>
-            <a:r>
-              <a:rPr lang="pt-BR" dirty="0" smtClean="0">
-                <a:solidFill>
-                  <a:schemeClr val="tx1"/>
-                </a:solidFill>
-              </a:rPr>
-              <a:t>métodos.</a:t>
-            </a:r>
             <a:endParaRPr lang="pt-BR" dirty="0">
               <a:solidFill>
                 <a:schemeClr val="tx1"/>
               </a:solidFill>
             </a:endParaRPr>
+          </a:p>
+          <a:p>
+            <a:r>
+              <a:rPr lang="pt-BR" dirty="0">
+                <a:solidFill>
+                  <a:schemeClr val="tx1"/>
+                </a:solidFill>
+              </a:rPr>
+              <a:t>permite a separação da construção de um objeto complexo da sua representação, de forma que o mesmo processo de construção possa criar diferentes representações, ou seja, permite separar os passos de construção de um objeto em pequenos métodos.</a:t>
+            </a:r>
           </a:p>
         </p:txBody>
       </p:sp>
@@ -4349,13 +4772,6 @@
   <p:clrMapOvr>
     <a:masterClrMapping/>
   </p:clrMapOvr>
-  <p:timing>
-    <p:tnLst>
-      <p:par>
-        <p:cTn id="1" dur="indefinite" restart="never" nodeType="tmRoot"/>
-      </p:par>
-    </p:tnLst>
-  </p:timing>
 </p:sld>
 </file>
 
@@ -4392,8 +4808,12 @@
           <a:lstStyle/>
           <a:p>
             <a:r>
-              <a:rPr lang="pt-BR" dirty="0" smtClean="0"/>
-              <a:t>Estrutura Builder</a:t>
+              <a:rPr lang="pt-BR" dirty="0"/>
+              <a:t>Estrutura </a:t>
+            </a:r>
+            <a:r>
+              <a:rPr lang="pt-BR" dirty="0" err="1"/>
+              <a:t>Builder</a:t>
             </a:r>
             <a:endParaRPr lang="pt-BR" dirty="0"/>
           </a:p>
@@ -4422,7 +4842,7 @@
           <a:lstStyle/>
           <a:p>
             <a:r>
-              <a:rPr lang="pt-BR" i="1" dirty="0" smtClean="0">
+              <a:rPr lang="pt-BR" i="1" dirty="0" err="1">
                 <a:solidFill>
                   <a:schemeClr val="tx1"/>
                 </a:solidFill>
@@ -4430,36 +4850,13 @@
               <a:t>Product</a:t>
             </a:r>
             <a:r>
-              <a:rPr lang="pt-BR" dirty="0" smtClean="0">
-                <a:solidFill>
-                  <a:schemeClr val="tx1"/>
-                </a:solidFill>
-              </a:rPr>
-              <a:t> </a:t>
-            </a:r>
-            <a:r>
               <a:rPr lang="pt-BR" dirty="0">
                 <a:solidFill>
                   <a:schemeClr val="tx1"/>
                 </a:solidFill>
               </a:rPr>
-              <a:t>— Classe básica</a:t>
-            </a:r>
-            <a:r>
-              <a:rPr lang="pt-BR" dirty="0" smtClean="0">
-                <a:solidFill>
-                  <a:schemeClr val="tx1"/>
-                </a:solidFill>
-              </a:rPr>
-              <a:t>.</a:t>
-            </a:r>
-            <a:endParaRPr lang="pt-BR" i="1" dirty="0" smtClean="0">
-              <a:solidFill>
-                <a:schemeClr val="tx1"/>
-              </a:solidFill>
-            </a:endParaRPr>
-          </a:p>
-          <a:p>
+              <a:t> — Classe básica.</a:t>
+            </a:r>
             <a:endParaRPr lang="pt-BR" i="1" dirty="0">
               <a:solidFill>
                 <a:schemeClr val="tx1"/>
@@ -4467,29 +4864,20 @@
             </a:endParaRPr>
           </a:p>
           <a:p>
-            <a:r>
-              <a:rPr lang="pt-BR" i="1" dirty="0">
-                <a:solidFill>
-                  <a:schemeClr val="tx1"/>
-                </a:solidFill>
-              </a:rPr>
-              <a:t>B</a:t>
-            </a:r>
-            <a:r>
-              <a:rPr lang="pt-BR" i="1" dirty="0" smtClean="0">
-                <a:solidFill>
-                  <a:schemeClr val="tx1"/>
-                </a:solidFill>
-              </a:rPr>
-              <a:t>uilder</a:t>
-            </a:r>
-            <a:r>
-              <a:rPr lang="pt-BR" dirty="0" smtClean="0">
-                <a:solidFill>
-                  <a:schemeClr val="tx1"/>
-                </a:solidFill>
-              </a:rPr>
-              <a:t> </a:t>
+            <a:endParaRPr lang="pt-BR" i="1" dirty="0">
+              <a:solidFill>
+                <a:schemeClr val="tx1"/>
+              </a:solidFill>
+            </a:endParaRPr>
+          </a:p>
+          <a:p>
+            <a:r>
+              <a:rPr lang="pt-BR" i="1" dirty="0" err="1">
+                <a:solidFill>
+                  <a:schemeClr val="tx1"/>
+                </a:solidFill>
+              </a:rPr>
+              <a:t>Builder</a:t>
             </a:r>
             <a:r>
               <a:rPr lang="pt-BR" dirty="0">
@@ -4497,15 +4885,15 @@
                   <a:schemeClr val="tx1"/>
                 </a:solidFill>
               </a:rPr>
-              <a:t>— </a:t>
-            </a:r>
-            <a:r>
-              <a:rPr lang="pt-BR" dirty="0" smtClean="0">
-                <a:solidFill>
-                  <a:schemeClr val="tx1"/>
-                </a:solidFill>
-              </a:rPr>
-              <a:t>Interface que possui metodos para </a:t>
+              <a:t> — Interface que possui </a:t>
+            </a:r>
+            <a:r>
+              <a:rPr lang="pt-BR" dirty="0" err="1">
+                <a:solidFill>
+                  <a:schemeClr val="tx1"/>
+                </a:solidFill>
+              </a:rPr>
+              <a:t>metodos</a:t>
             </a:r>
             <a:r>
               <a:rPr lang="pt-BR" dirty="0">
@@ -4513,23 +4901,7 @@
                   <a:schemeClr val="tx1"/>
                 </a:solidFill>
               </a:rPr>
-              <a:t>construir cada um dos dados do </a:t>
-            </a:r>
-            <a:r>
-              <a:rPr lang="pt-BR" dirty="0" smtClean="0">
-                <a:solidFill>
-                  <a:schemeClr val="tx1"/>
-                </a:solidFill>
-              </a:rPr>
-              <a:t>Produto</a:t>
-            </a:r>
-            <a:r>
-              <a:rPr lang="pt-BR" dirty="0">
-                <a:solidFill>
-                  <a:schemeClr val="tx1"/>
-                </a:solidFill>
-              </a:rPr>
-              <a:t>.</a:t>
+              <a:t> para construir cada um dos dados do Produto.</a:t>
             </a:r>
           </a:p>
           <a:p>
@@ -4544,7 +4916,7 @@
           </a:p>
           <a:p>
             <a:r>
-              <a:rPr lang="pt-BR" i="1" dirty="0" smtClean="0">
+              <a:rPr lang="pt-BR" i="1" dirty="0">
                 <a:solidFill>
                   <a:schemeClr val="tx1"/>
                 </a:solidFill>
@@ -4552,7 +4924,7 @@
               <a:t>Concrete </a:t>
             </a:r>
             <a:r>
-              <a:rPr lang="pt-BR" i="1" dirty="0">
+              <a:rPr lang="pt-BR" i="1" dirty="0" err="1">
                 <a:solidFill>
                   <a:schemeClr val="tx1"/>
                 </a:solidFill>
@@ -4568,7 +4940,7 @@
               <a:t> — define uma implementação da interface </a:t>
             </a:r>
             <a:r>
-              <a:rPr lang="pt-BR" i="1" dirty="0" smtClean="0">
+              <a:rPr lang="pt-BR" i="1" dirty="0" err="1">
                 <a:solidFill>
                   <a:schemeClr val="tx1"/>
                 </a:solidFill>
@@ -4576,7 +4948,7 @@
               <a:t>builder</a:t>
             </a:r>
             <a:r>
-              <a:rPr lang="pt-BR" dirty="0" smtClean="0">
+              <a:rPr lang="pt-BR" dirty="0">
                 <a:solidFill>
                   <a:schemeClr val="tx1"/>
                 </a:solidFill>
@@ -4588,58 +4960,45 @@
             <a:pPr marL="0" indent="0">
               <a:buNone/>
             </a:pPr>
-            <a:endParaRPr lang="pt-BR" dirty="0" smtClean="0">
-              <a:solidFill>
-                <a:schemeClr val="tx1"/>
-              </a:solidFill>
-            </a:endParaRPr>
-          </a:p>
-          <a:p>
-            <a:r>
-              <a:rPr lang="pt-BR" i="1" dirty="0" smtClean="0">
-                <a:solidFill>
-                  <a:schemeClr val="tx1"/>
-                </a:solidFill>
-              </a:rPr>
-              <a:t>Director</a:t>
-            </a:r>
-            <a:r>
-              <a:rPr lang="pt-BR" dirty="0" smtClean="0">
-                <a:solidFill>
-                  <a:schemeClr val="tx1"/>
-                </a:solidFill>
-              </a:rPr>
-              <a:t> </a:t>
-            </a:r>
-            <a:r>
-              <a:rPr lang="pt-BR" dirty="0">
-                <a:solidFill>
-                  <a:schemeClr val="tx1"/>
-                </a:solidFill>
-              </a:rPr>
-              <a:t>— constrói um objeto utilizando a interface do </a:t>
-            </a:r>
-            <a:r>
-              <a:rPr lang="pt-BR" i="1" dirty="0" smtClean="0">
-                <a:solidFill>
-                  <a:schemeClr val="tx1"/>
-                </a:solidFill>
-              </a:rPr>
-              <a:t>builder</a:t>
-            </a:r>
-            <a:r>
-              <a:rPr lang="pt-BR" dirty="0" smtClean="0">
-                <a:solidFill>
-                  <a:schemeClr val="tx1"/>
-                </a:solidFill>
-              </a:rPr>
-              <a:t>.</a:t>
-            </a:r>
             <a:endParaRPr lang="pt-BR" dirty="0">
               <a:solidFill>
                 <a:schemeClr val="tx1"/>
               </a:solidFill>
             </a:endParaRPr>
+          </a:p>
+          <a:p>
+            <a:r>
+              <a:rPr lang="pt-BR" i="1" dirty="0" err="1">
+                <a:solidFill>
+                  <a:schemeClr val="tx1"/>
+                </a:solidFill>
+              </a:rPr>
+              <a:t>Director</a:t>
+            </a:r>
+            <a:r>
+              <a:rPr lang="pt-BR" dirty="0">
+                <a:solidFill>
+                  <a:schemeClr val="tx1"/>
+                </a:solidFill>
+              </a:rPr>
+              <a:t> — constrói um objeto utilizando a interface do </a:t>
+            </a:r>
+            <a:r>
+              <a:rPr lang="pt-BR" i="1" dirty="0" err="1">
+                <a:solidFill>
+                  <a:schemeClr val="tx1"/>
+                </a:solidFill>
+              </a:rPr>
+              <a:t>builder</a:t>
+            </a:r>
+            <a:r>
+              <a:rPr lang="pt-BR" dirty="0">
+                <a:solidFill>
+                  <a:schemeClr val="tx1"/>
+                </a:solidFill>
+              </a:rPr>
+              <a:t>.</a:t>
+            </a:r>
           </a:p>
           <a:p>
             <a:endParaRPr lang="pt-BR" dirty="0"/>
@@ -4659,13 +5018,6 @@
   <p:clrMapOvr>
     <a:masterClrMapping/>
   </p:clrMapOvr>
-  <p:timing>
-    <p:tnLst>
-      <p:par>
-        <p:cTn id="1" dur="indefinite" restart="never" nodeType="tmRoot"/>
-      </p:par>
-    </p:tnLst>
-  </p:timing>
 </p:sld>
 </file>
 
@@ -4702,10 +5054,9 @@
           <a:lstStyle/>
           <a:p>
             <a:r>
-              <a:rPr lang="pt-BR" dirty="0" smtClean="0"/>
+              <a:rPr lang="pt-BR" dirty="0"/>
               <a:t>Product</a:t>
             </a:r>
-            <a:endParaRPr lang="pt-BR" dirty="0"/>
           </a:p>
         </p:txBody>
       </p:sp>
@@ -4734,7 +5085,7 @@
           </a:p>
           <a:p>
             <a:r>
-              <a:rPr lang="pt-BR" dirty="0" smtClean="0">
+              <a:rPr lang="pt-BR" dirty="0">
                 <a:solidFill>
                   <a:schemeClr val="tx1"/>
                 </a:solidFill>
@@ -4768,7 +5119,7 @@
           <a:lstStyle/>
           <a:p>
             <a:r>
-              <a:rPr lang="pt-BR" sz="2400" b="1" dirty="0" smtClean="0">
+              <a:rPr lang="pt-BR" sz="2400" b="1" dirty="0">
                 <a:latin typeface="Arial" pitchFamily="34" charset="0"/>
                 <a:cs typeface="Arial" pitchFamily="34" charset="0"/>
               </a:rPr>
@@ -4777,7 +5128,7 @@
           </a:p>
           <a:p>
             <a:r>
-              <a:rPr lang="pt-BR" sz="2400" b="1" dirty="0" smtClean="0">
+              <a:rPr lang="pt-BR" sz="2400" b="1" dirty="0">
                 <a:latin typeface="Arial" pitchFamily="34" charset="0"/>
                 <a:cs typeface="Arial" pitchFamily="34" charset="0"/>
               </a:rPr>
@@ -4786,7 +5137,7 @@
           </a:p>
           <a:p>
             <a:r>
-              <a:rPr lang="pt-BR" sz="2400" b="1" dirty="0" smtClean="0">
+              <a:rPr lang="pt-BR" sz="2400" b="1" dirty="0">
                 <a:latin typeface="Arial" pitchFamily="34" charset="0"/>
                 <a:cs typeface="Arial" pitchFamily="34" charset="0"/>
               </a:rPr>
@@ -4795,7 +5146,7 @@
           </a:p>
           <a:p>
             <a:r>
-              <a:rPr lang="pt-BR" sz="2400" b="1" dirty="0" smtClean="0">
+              <a:rPr lang="pt-BR" sz="2400" b="1" dirty="0">
                 <a:latin typeface="Arial" pitchFamily="34" charset="0"/>
                 <a:cs typeface="Arial" pitchFamily="34" charset="0"/>
               </a:rPr>
@@ -4804,7 +5155,7 @@
           </a:p>
           <a:p>
             <a:r>
-              <a:rPr lang="pt-BR" sz="2400" b="1" dirty="0" smtClean="0">
+              <a:rPr lang="pt-BR" sz="2400" b="1" dirty="0">
                 <a:latin typeface="Arial" pitchFamily="34" charset="0"/>
                 <a:cs typeface="Arial" pitchFamily="34" charset="0"/>
               </a:rPr>
@@ -4813,7 +5164,7 @@
           </a:p>
           <a:p>
             <a:r>
-              <a:rPr lang="pt-BR" sz="2400" b="1" dirty="0" smtClean="0">
+              <a:rPr lang="pt-BR" sz="2400" b="1" dirty="0">
                 <a:latin typeface="Arial" pitchFamily="34" charset="0"/>
                 <a:cs typeface="Arial" pitchFamily="34" charset="0"/>
               </a:rPr>
@@ -4822,7 +5173,7 @@
           </a:p>
           <a:p>
             <a:r>
-              <a:rPr lang="pt-BR" sz="2400" b="1" dirty="0" smtClean="0">
+              <a:rPr lang="pt-BR" sz="2400" b="1" dirty="0">
                 <a:latin typeface="Arial" pitchFamily="34" charset="0"/>
                 <a:cs typeface="Arial" pitchFamily="34" charset="0"/>
               </a:rPr>
@@ -4847,13 +5198,6 @@
   <p:clrMapOvr>
     <a:masterClrMapping/>
   </p:clrMapOvr>
-  <p:timing>
-    <p:tnLst>
-      <p:par>
-        <p:cTn id="1" dur="indefinite" restart="never" nodeType="tmRoot"/>
-      </p:par>
-    </p:tnLst>
-  </p:timing>
 </p:sld>
 </file>
 
@@ -4890,10 +5234,9 @@
           <a:lstStyle/>
           <a:p>
             <a:r>
-              <a:rPr lang="pt-BR" dirty="0" smtClean="0"/>
+              <a:rPr lang="pt-BR" dirty="0"/>
               <a:t>Builder</a:t>
             </a:r>
-            <a:endParaRPr lang="pt-BR" dirty="0"/>
           </a:p>
         </p:txBody>
       </p:sp>
@@ -4915,18 +5258,13 @@
           <a:lstStyle/>
           <a:p>
             <a:r>
-              <a:rPr lang="pt-BR" dirty="0" smtClean="0">
+              <a:rPr lang="pt-BR" dirty="0">
                 <a:solidFill>
                   <a:schemeClr val="tx1"/>
                 </a:solidFill>
               </a:rPr>
               <a:t>Exemplo:</a:t>
             </a:r>
-            <a:endParaRPr lang="pt-BR" dirty="0">
-              <a:solidFill>
-                <a:schemeClr val="tx1"/>
-              </a:solidFill>
-            </a:endParaRPr>
           </a:p>
         </p:txBody>
       </p:sp>
@@ -4953,7 +5291,7 @@
           <a:lstStyle/>
           <a:p>
             <a:r>
-              <a:rPr lang="pt-BR" sz="1600" b="1" dirty="0" smtClean="0">
+              <a:rPr lang="pt-BR" sz="1600" b="1" dirty="0">
                 <a:latin typeface="Arial" pitchFamily="34" charset="0"/>
                 <a:cs typeface="Arial" pitchFamily="34" charset="0"/>
               </a:rPr>
@@ -4962,7 +5300,7 @@
           </a:p>
           <a:p>
             <a:r>
-              <a:rPr lang="pt-BR" sz="1600" b="1" dirty="0" smtClean="0">
+              <a:rPr lang="pt-BR" sz="1600" b="1" dirty="0">
                 <a:latin typeface="Arial" pitchFamily="34" charset="0"/>
                 <a:cs typeface="Arial" pitchFamily="34" charset="0"/>
               </a:rPr>
@@ -4970,14 +5308,14 @@
             </a:r>
           </a:p>
           <a:p>
-            <a:endParaRPr lang="pt-BR" sz="1600" b="1" dirty="0" smtClean="0">
+            <a:endParaRPr lang="pt-BR" sz="1600" b="1" dirty="0">
               <a:latin typeface="Arial" pitchFamily="34" charset="0"/>
               <a:cs typeface="Arial" pitchFamily="34" charset="0"/>
             </a:endParaRPr>
           </a:p>
           <a:p>
             <a:r>
-              <a:rPr lang="pt-BR" sz="1600" b="1" dirty="0" smtClean="0">
+              <a:rPr lang="pt-BR" sz="1600" b="1" dirty="0">
                 <a:latin typeface="Arial" pitchFamily="34" charset="0"/>
                 <a:cs typeface="Arial" pitchFamily="34" charset="0"/>
               </a:rPr>
@@ -4986,7 +5324,7 @@
           </a:p>
           <a:p>
             <a:r>
-              <a:rPr lang="pt-BR" sz="1600" b="1" dirty="0" smtClean="0">
+              <a:rPr lang="pt-BR" sz="1600" b="1" dirty="0">
                 <a:latin typeface="Arial" pitchFamily="34" charset="0"/>
                 <a:cs typeface="Arial" pitchFamily="34" charset="0"/>
               </a:rPr>
@@ -4995,7 +5333,7 @@
           </a:p>
           <a:p>
             <a:r>
-              <a:rPr lang="pt-BR" sz="1600" b="1" dirty="0" smtClean="0">
+              <a:rPr lang="pt-BR" sz="1600" b="1" dirty="0">
                 <a:latin typeface="Arial" pitchFamily="34" charset="0"/>
                 <a:cs typeface="Arial" pitchFamily="34" charset="0"/>
               </a:rPr>
@@ -5004,7 +5342,7 @@
           </a:p>
           <a:p>
             <a:r>
-              <a:rPr lang="pt-BR" sz="1600" b="1" dirty="0" smtClean="0">
+              <a:rPr lang="pt-BR" sz="1600" b="1" dirty="0">
                 <a:latin typeface="Arial" pitchFamily="34" charset="0"/>
                 <a:cs typeface="Arial" pitchFamily="34" charset="0"/>
               </a:rPr>
@@ -5013,7 +5351,7 @@
           </a:p>
           <a:p>
             <a:r>
-              <a:rPr lang="pt-BR" sz="1600" b="1" dirty="0" smtClean="0">
+              <a:rPr lang="pt-BR" sz="1600" b="1" dirty="0">
                 <a:latin typeface="Arial" pitchFamily="34" charset="0"/>
                 <a:cs typeface="Arial" pitchFamily="34" charset="0"/>
               </a:rPr>
@@ -5022,7 +5360,7 @@
           </a:p>
           <a:p>
             <a:r>
-              <a:rPr lang="pt-BR" sz="1600" b="1" dirty="0" smtClean="0">
+              <a:rPr lang="pt-BR" sz="1600" b="1" dirty="0">
                 <a:latin typeface="Arial" pitchFamily="34" charset="0"/>
                 <a:cs typeface="Arial" pitchFamily="34" charset="0"/>
               </a:rPr>
@@ -5031,7 +5369,7 @@
           </a:p>
           <a:p>
             <a:r>
-              <a:rPr lang="pt-BR" sz="1600" b="1" dirty="0" smtClean="0">
+              <a:rPr lang="pt-BR" sz="1600" b="1" dirty="0">
                 <a:latin typeface="Arial" pitchFamily="34" charset="0"/>
                 <a:cs typeface="Arial" pitchFamily="34" charset="0"/>
               </a:rPr>
@@ -5040,7 +5378,7 @@
           </a:p>
           <a:p>
             <a:r>
-              <a:rPr lang="pt-BR" sz="1600" b="1" dirty="0" smtClean="0">
+              <a:rPr lang="pt-BR" sz="1600" b="1" dirty="0">
                 <a:latin typeface="Arial" pitchFamily="34" charset="0"/>
                 <a:cs typeface="Arial" pitchFamily="34" charset="0"/>
               </a:rPr>
@@ -5049,7 +5387,7 @@
           </a:p>
           <a:p>
             <a:r>
-              <a:rPr lang="pt-BR" sz="1600" b="1" dirty="0" smtClean="0">
+              <a:rPr lang="pt-BR" sz="1600" b="1" dirty="0">
                 <a:latin typeface="Arial" pitchFamily="34" charset="0"/>
                 <a:cs typeface="Arial" pitchFamily="34" charset="0"/>
               </a:rPr>
@@ -5058,7 +5396,7 @@
           </a:p>
           <a:p>
             <a:r>
-              <a:rPr lang="pt-BR" sz="1600" b="1" dirty="0" smtClean="0">
+              <a:rPr lang="pt-BR" sz="1600" b="1" dirty="0">
                 <a:latin typeface="Arial" pitchFamily="34" charset="0"/>
                 <a:cs typeface="Arial" pitchFamily="34" charset="0"/>
               </a:rPr>
@@ -5067,7 +5405,7 @@
           </a:p>
           <a:p>
             <a:r>
-              <a:rPr lang="pt-BR" sz="1600" b="1" dirty="0" smtClean="0">
+              <a:rPr lang="pt-BR" sz="1600" b="1" dirty="0">
                 <a:latin typeface="Arial" pitchFamily="34" charset="0"/>
                 <a:cs typeface="Arial" pitchFamily="34" charset="0"/>
               </a:rPr>
@@ -5076,7 +5414,7 @@
           </a:p>
           <a:p>
             <a:r>
-              <a:rPr lang="pt-BR" sz="1600" b="1" dirty="0" smtClean="0">
+              <a:rPr lang="pt-BR" sz="1600" b="1" dirty="0">
                 <a:latin typeface="Arial" pitchFamily="34" charset="0"/>
                 <a:cs typeface="Arial" pitchFamily="34" charset="0"/>
               </a:rPr>
@@ -5085,7 +5423,7 @@
           </a:p>
           <a:p>
             <a:r>
-              <a:rPr lang="pt-BR" sz="1600" b="1" dirty="0" smtClean="0">
+              <a:rPr lang="pt-BR" sz="1600" b="1" dirty="0">
                 <a:latin typeface="Arial" pitchFamily="34" charset="0"/>
                 <a:cs typeface="Arial" pitchFamily="34" charset="0"/>
               </a:rPr>
@@ -5104,13 +5442,6 @@
   <p:clrMapOvr>
     <a:masterClrMapping/>
   </p:clrMapOvr>
-  <p:timing>
-    <p:tnLst>
-      <p:par>
-        <p:cTn id="1" dur="indefinite" restart="never" nodeType="tmRoot"/>
-      </p:par>
-    </p:tnLst>
-  </p:timing>
 </p:sld>
 </file>
 
@@ -5434,27 +5765,7 @@
                 <a:latin typeface="Arial" pitchFamily="34" charset="0"/>
                 <a:cs typeface="Arial" pitchFamily="34" charset="0"/>
               </a:rPr>
-              <a:t>    </a:t>
-            </a:r>
-            <a:r>
-              <a:rPr lang="pt-BR" sz="5600" b="1" dirty="0" smtClean="0">
-                <a:solidFill>
-                  <a:schemeClr val="tx1"/>
-                </a:solidFill>
-                <a:latin typeface="Arial" pitchFamily="34" charset="0"/>
-                <a:cs typeface="Arial" pitchFamily="34" charset="0"/>
-              </a:rPr>
-              <a:t>}</a:t>
-            </a:r>
-            <a:r>
-              <a:rPr lang="pt-BR" sz="5600" b="1" dirty="0">
-                <a:solidFill>
-                  <a:schemeClr val="tx1"/>
-                </a:solidFill>
-                <a:latin typeface="Arial" pitchFamily="34" charset="0"/>
-                <a:cs typeface="Arial" pitchFamily="34" charset="0"/>
-              </a:rPr>
-              <a:t> </a:t>
+              <a:t>    } </a:t>
             </a:r>
             <a:endParaRPr lang="pt-BR" dirty="0">
               <a:latin typeface="Arial" pitchFamily="34" charset="0"/>
@@ -5484,10 +5795,9 @@
           <a:lstStyle/>
           <a:p>
             <a:r>
-              <a:rPr lang="pt-BR" dirty="0" smtClean="0"/>
+              <a:rPr lang="pt-BR" dirty="0"/>
               <a:t>Concrete Builder</a:t>
             </a:r>
-            <a:endParaRPr lang="pt-BR" dirty="0"/>
           </a:p>
         </p:txBody>
       </p:sp>
@@ -5868,13 +6178,6 @@
   <p:clrMapOvr>
     <a:masterClrMapping/>
   </p:clrMapOvr>
-  <p:timing>
-    <p:tnLst>
-      <p:par>
-        <p:cTn id="1" dur="indefinite" restart="never" nodeType="tmRoot"/>
-      </p:par>
-    </p:tnLst>
-  </p:timing>
 </p:sld>
 </file>
 
@@ -6224,10 +6527,9 @@
           <a:lstStyle/>
           <a:p>
             <a:r>
-              <a:rPr lang="pt-BR" dirty="0" smtClean="0"/>
+              <a:rPr lang="pt-BR" dirty="0"/>
               <a:t>Concrete Builder</a:t>
             </a:r>
-            <a:endParaRPr lang="pt-BR" dirty="0"/>
           </a:p>
         </p:txBody>
       </p:sp>
@@ -6241,13 +6543,6 @@
   <p:clrMapOvr>
     <a:masterClrMapping/>
   </p:clrMapOvr>
-  <p:timing>
-    <p:tnLst>
-      <p:par>
-        <p:cTn id="1" dur="indefinite" restart="never" nodeType="tmRoot"/>
-      </p:par>
-    </p:tnLst>
-  </p:timing>
 </p:sld>
 </file>
 
@@ -6676,13 +6971,6 @@
   <p:clrMapOvr>
     <a:masterClrMapping/>
   </p:clrMapOvr>
-  <p:timing>
-    <p:tnLst>
-      <p:par>
-        <p:cTn id="1" dur="indefinite" restart="never" nodeType="tmRoot"/>
-      </p:par>
-    </p:tnLst>
-  </p:timing>
 </p:sld>
 </file>
 

</xml_diff>